<commit_message>
Lau - 3ra Presentación
</commit_message>
<xml_diff>
--- a/Docs/06-Diseño/TerceraPresentacion.pptx
+++ b/Docs/06-Diseño/TerceraPresentacion.pptx
@@ -2427,7 +2427,7 @@
 </file>
 
 <file path=ppt/diagrams/colors4.xml><?xml version="1.0" encoding="utf-8"?>
-<dgm:colorsDef xmlns:dgm="http://schemas.openxmlformats.org/drawingml/2006/diagram" xmlns:a="http://schemas.openxmlformats.org/drawingml/2006/main" uniqueId="urn:microsoft.com/office/officeart/2005/8/colors/colorful1">
+<dgm:colorsDef xmlns:dgm="http://schemas.openxmlformats.org/drawingml/2006/diagram" xmlns:a="http://schemas.openxmlformats.org/drawingml/2006/main" uniqueId="urn:microsoft.com/office/officeart/2005/8/colors/colorful1#1">
   <dgm:title val=""/>
   <dgm:desc val=""/>
   <dgm:catLst>
@@ -3361,23 +3361,7 @@
         <a:p>
           <a:r>
             <a:rPr lang="es-AR" dirty="0" smtClean="0"/>
-            <a:t>Descripción de </a:t>
-          </a:r>
-          <a:r>
-            <a:rPr lang="es-AR" dirty="0" err="1" smtClean="0"/>
-            <a:t>User</a:t>
-          </a:r>
-          <a:r>
-            <a:rPr lang="es-AR" dirty="0" smtClean="0"/>
-            <a:t> </a:t>
-          </a:r>
-          <a:r>
-            <a:rPr lang="es-AR" dirty="0" err="1" smtClean="0"/>
-            <a:t>Stories</a:t>
-          </a:r>
-          <a:r>
-            <a:rPr lang="es-AR" dirty="0" smtClean="0"/>
-            <a:t> para Trabajar</a:t>
+            <a:t>Descripción de User Stories para Trabajar</a:t>
           </a:r>
           <a:endParaRPr lang="es-AR" dirty="0"/>
         </a:p>
@@ -3560,7 +3544,7 @@
   <dgm:whole/>
   <dgm:extLst>
     <a:ext uri="http://schemas.microsoft.com/office/drawing/2008/diagram">
-      <dsp:dataModelExt xmlns:dsp="http://schemas.microsoft.com/office/drawing/2008/diagram" relId="rId20" minVer="http://schemas.openxmlformats.org/drawingml/2006/diagram"/>
+      <dsp:dataModelExt xmlns:dsp="http://schemas.microsoft.com/office/drawing/2008/diagram" relId="rId19" minVer="http://schemas.openxmlformats.org/drawingml/2006/diagram"/>
     </a:ext>
   </dgm:extLst>
 </dgm:dataModel>
@@ -3587,12 +3571,8 @@
         <a:lstStyle/>
         <a:p>
           <a:r>
-            <a:rPr lang="es-AR" dirty="0" err="1" smtClean="0"/>
-            <a:t>Version</a:t>
-          </a:r>
-          <a:r>
             <a:rPr lang="es-AR" dirty="0" smtClean="0"/>
-            <a:t> </a:t>
+            <a:t>Version </a:t>
           </a:r>
           <a:r>
             <a:rPr lang="es-AR" dirty="0" err="1" smtClean="0"/>
@@ -3685,12 +3665,8 @@
         <a:lstStyle/>
         <a:p>
           <a:r>
-            <a:rPr lang="es-AR" dirty="0" err="1" smtClean="0"/>
-            <a:t>ScrumUP</a:t>
-          </a:r>
-          <a:r>
             <a:rPr lang="es-AR" dirty="0" smtClean="0"/>
-            <a:t>: Soporte al Diseño</a:t>
+            <a:t>ScrumUP: Soporte al Diseño</a:t>
           </a:r>
           <a:endParaRPr lang="es-AR" dirty="0"/>
         </a:p>
@@ -3923,7 +3899,7 @@
   <dgm:whole/>
   <dgm:extLst>
     <a:ext uri="http://schemas.microsoft.com/office/drawing/2008/diagram">
-      <dsp:dataModelExt xmlns:dsp="http://schemas.microsoft.com/office/drawing/2008/diagram" relId="rId25" minVer="http://schemas.openxmlformats.org/drawingml/2006/diagram"/>
+      <dsp:dataModelExt xmlns:dsp="http://schemas.microsoft.com/office/drawing/2008/diagram" relId="rId24" minVer="http://schemas.openxmlformats.org/drawingml/2006/diagram"/>
     </a:ext>
   </dgm:extLst>
 </dgm:dataModel>
@@ -3990,7 +3966,7 @@
         <a:p>
           <a:r>
             <a:rPr lang="es-AR" dirty="0" smtClean="0"/>
-            <a:t>Comunicación</a:t>
+            <a:t>Comunicación y sinergia</a:t>
           </a:r>
           <a:endParaRPr lang="es-AR" dirty="0"/>
         </a:p>
@@ -4303,22 +4279,22 @@
     </dgm:pt>
   </dgm:ptLst>
   <dgm:cxnLst>
+    <dgm:cxn modelId="{D66E637B-4419-44A4-A15B-22DB2B1E27C6}" type="presOf" srcId="{F57BDE71-A3CA-4D28-A6BB-808300EFDE0A}" destId="{90648282-E4A6-4FCD-8007-87322E8CC578}" srcOrd="0" destOrd="0" presId="urn:microsoft.com/office/officeart/2005/8/layout/cycle6"/>
+    <dgm:cxn modelId="{55C8C507-DED5-4A10-A503-4575EA51AA28}" srcId="{9B68D3FB-C94B-42C0-9C5C-84AD74BF3E3D}" destId="{6BF80D2C-87ED-4B30-98D6-97E7C3395772}" srcOrd="1" destOrd="0" parTransId="{9E2701F6-744A-4D1D-BEF1-918641DD5A21}" sibTransId="{F57BDE71-A3CA-4D28-A6BB-808300EFDE0A}"/>
+    <dgm:cxn modelId="{D64BF8AB-5FED-48C6-B388-C6CE3D7673D4}" type="presOf" srcId="{9340921C-E321-41A9-93A7-D68A55C2E151}" destId="{D16D0FFB-E1C7-4F23-8323-FF0EBA0EBD51}" srcOrd="0" destOrd="0" presId="urn:microsoft.com/office/officeart/2005/8/layout/cycle6"/>
+    <dgm:cxn modelId="{27916829-6A0D-4631-993F-B43AC853C866}" type="presOf" srcId="{1FA4911C-6EF5-4C18-9C53-725FD5E0A2A7}" destId="{AB8536FE-B38B-4050-AFD2-F6B4BD3B2A7E}" srcOrd="0" destOrd="0" presId="urn:microsoft.com/office/officeart/2005/8/layout/cycle6"/>
+    <dgm:cxn modelId="{813ED8BD-D7EE-4D8F-ABF1-02E6BC0FB7F2}" srcId="{9B68D3FB-C94B-42C0-9C5C-84AD74BF3E3D}" destId="{6A937107-F88E-47D7-8F75-A8CB40B0F9FC}" srcOrd="3" destOrd="0" parTransId="{F4A114BE-91CB-427C-914F-57CA291E9192}" sibTransId="{9340921C-E321-41A9-93A7-D68A55C2E151}"/>
+    <dgm:cxn modelId="{3C708B36-4121-4224-924E-458643FB25B0}" type="presOf" srcId="{70C0947B-05DB-437D-BC43-E2CA6C3732A8}" destId="{7609C7A8-6834-4098-8147-9E713360850B}" srcOrd="0" destOrd="0" presId="urn:microsoft.com/office/officeart/2005/8/layout/cycle6"/>
+    <dgm:cxn modelId="{A0B8CFA2-31F9-416E-BA6B-727396241ADD}" type="presOf" srcId="{ABD2D057-7FDD-4905-81A8-340D42A7B283}" destId="{FEC496E8-C65C-402D-8064-5221BA6837E8}" srcOrd="0" destOrd="0" presId="urn:microsoft.com/office/officeart/2005/8/layout/cycle6"/>
+    <dgm:cxn modelId="{8DE38658-8C32-4D8B-A042-A4BB459464D2}" type="presOf" srcId="{6BF80D2C-87ED-4B30-98D6-97E7C3395772}" destId="{3697D997-821B-4F5A-8A54-092A11DE83A2}" srcOrd="0" destOrd="0" presId="urn:microsoft.com/office/officeart/2005/8/layout/cycle6"/>
     <dgm:cxn modelId="{2F424FB8-EE29-4D76-852B-517FEEF1B6C9}" type="presOf" srcId="{9B68D3FB-C94B-42C0-9C5C-84AD74BF3E3D}" destId="{FDFF09C0-5AFF-4BCE-988C-B1D6A5E396A2}" srcOrd="0" destOrd="0" presId="urn:microsoft.com/office/officeart/2005/8/layout/cycle6"/>
+    <dgm:cxn modelId="{951FAED8-11CB-4D82-BEEF-584D716B203E}" srcId="{9B68D3FB-C94B-42C0-9C5C-84AD74BF3E3D}" destId="{1B92485D-E43C-4404-A924-D86B7F47CB25}" srcOrd="0" destOrd="0" parTransId="{F9945496-598B-4007-BAD9-43092284566D}" sibTransId="{F715962E-22AE-4FE3-86F5-A694809ABAE9}"/>
+    <dgm:cxn modelId="{64F7D4B6-7D7A-4FA7-9949-681F6343501B}" type="presOf" srcId="{C4706D54-E470-4E18-9B74-D6DD76F800BF}" destId="{202054EF-3964-4EA6-8AF4-B8F64BC3B7BF}" srcOrd="0" destOrd="0" presId="urn:microsoft.com/office/officeart/2005/8/layout/cycle6"/>
     <dgm:cxn modelId="{BC613717-C7FA-4AD0-85C6-1483FF43FC08}" type="presOf" srcId="{F715962E-22AE-4FE3-86F5-A694809ABAE9}" destId="{E10F037C-B19B-4558-82A2-B024110294FC}" srcOrd="0" destOrd="0" presId="urn:microsoft.com/office/officeart/2005/8/layout/cycle6"/>
+    <dgm:cxn modelId="{07FE96A3-02A1-4905-B9C1-3BE93F0CE52F}" type="presOf" srcId="{1B92485D-E43C-4404-A924-D86B7F47CB25}" destId="{21E17367-BCF7-4605-8FD6-67CA1BAB99CB}" srcOrd="0" destOrd="0" presId="urn:microsoft.com/office/officeart/2005/8/layout/cycle6"/>
+    <dgm:cxn modelId="{93D6071F-180C-4C74-96C2-4D1FA49DC6BB}" srcId="{9B68D3FB-C94B-42C0-9C5C-84AD74BF3E3D}" destId="{ABD2D057-7FDD-4905-81A8-340D42A7B283}" srcOrd="2" destOrd="0" parTransId="{537CA6FF-34FE-4940-9753-3B7960C88F63}" sibTransId="{C4706D54-E470-4E18-9B74-D6DD76F800BF}"/>
     <dgm:cxn modelId="{6D47E087-D1B4-487C-BF43-6369F1A0F3C4}" srcId="{9B68D3FB-C94B-42C0-9C5C-84AD74BF3E3D}" destId="{1FA4911C-6EF5-4C18-9C53-725FD5E0A2A7}" srcOrd="4" destOrd="0" parTransId="{6955A2D1-1C24-4FEA-8E59-89617C91A041}" sibTransId="{70C0947B-05DB-437D-BC43-E2CA6C3732A8}"/>
-    <dgm:cxn modelId="{3C708B36-4121-4224-924E-458643FB25B0}" type="presOf" srcId="{70C0947B-05DB-437D-BC43-E2CA6C3732A8}" destId="{7609C7A8-6834-4098-8147-9E713360850B}" srcOrd="0" destOrd="0" presId="urn:microsoft.com/office/officeart/2005/8/layout/cycle6"/>
-    <dgm:cxn modelId="{951FAED8-11CB-4D82-BEEF-584D716B203E}" srcId="{9B68D3FB-C94B-42C0-9C5C-84AD74BF3E3D}" destId="{1B92485D-E43C-4404-A924-D86B7F47CB25}" srcOrd="0" destOrd="0" parTransId="{F9945496-598B-4007-BAD9-43092284566D}" sibTransId="{F715962E-22AE-4FE3-86F5-A694809ABAE9}"/>
-    <dgm:cxn modelId="{813ED8BD-D7EE-4D8F-ABF1-02E6BC0FB7F2}" srcId="{9B68D3FB-C94B-42C0-9C5C-84AD74BF3E3D}" destId="{6A937107-F88E-47D7-8F75-A8CB40B0F9FC}" srcOrd="3" destOrd="0" parTransId="{F4A114BE-91CB-427C-914F-57CA291E9192}" sibTransId="{9340921C-E321-41A9-93A7-D68A55C2E151}"/>
-    <dgm:cxn modelId="{07FE96A3-02A1-4905-B9C1-3BE93F0CE52F}" type="presOf" srcId="{1B92485D-E43C-4404-A924-D86B7F47CB25}" destId="{21E17367-BCF7-4605-8FD6-67CA1BAB99CB}" srcOrd="0" destOrd="0" presId="urn:microsoft.com/office/officeart/2005/8/layout/cycle6"/>
     <dgm:cxn modelId="{A7B2E02F-E03C-4BC5-8183-60FD84B0D8AA}" type="presOf" srcId="{6A937107-F88E-47D7-8F75-A8CB40B0F9FC}" destId="{8D4852E9-0747-4BDB-BE86-716E4B6AC65B}" srcOrd="0" destOrd="0" presId="urn:microsoft.com/office/officeart/2005/8/layout/cycle6"/>
-    <dgm:cxn modelId="{27916829-6A0D-4631-993F-B43AC853C866}" type="presOf" srcId="{1FA4911C-6EF5-4C18-9C53-725FD5E0A2A7}" destId="{AB8536FE-B38B-4050-AFD2-F6B4BD3B2A7E}" srcOrd="0" destOrd="0" presId="urn:microsoft.com/office/officeart/2005/8/layout/cycle6"/>
-    <dgm:cxn modelId="{A0B8CFA2-31F9-416E-BA6B-727396241ADD}" type="presOf" srcId="{ABD2D057-7FDD-4905-81A8-340D42A7B283}" destId="{FEC496E8-C65C-402D-8064-5221BA6837E8}" srcOrd="0" destOrd="0" presId="urn:microsoft.com/office/officeart/2005/8/layout/cycle6"/>
-    <dgm:cxn modelId="{D64BF8AB-5FED-48C6-B388-C6CE3D7673D4}" type="presOf" srcId="{9340921C-E321-41A9-93A7-D68A55C2E151}" destId="{D16D0FFB-E1C7-4F23-8323-FF0EBA0EBD51}" srcOrd="0" destOrd="0" presId="urn:microsoft.com/office/officeart/2005/8/layout/cycle6"/>
-    <dgm:cxn modelId="{D66E637B-4419-44A4-A15B-22DB2B1E27C6}" type="presOf" srcId="{F57BDE71-A3CA-4D28-A6BB-808300EFDE0A}" destId="{90648282-E4A6-4FCD-8007-87322E8CC578}" srcOrd="0" destOrd="0" presId="urn:microsoft.com/office/officeart/2005/8/layout/cycle6"/>
-    <dgm:cxn modelId="{8DE38658-8C32-4D8B-A042-A4BB459464D2}" type="presOf" srcId="{6BF80D2C-87ED-4B30-98D6-97E7C3395772}" destId="{3697D997-821B-4F5A-8A54-092A11DE83A2}" srcOrd="0" destOrd="0" presId="urn:microsoft.com/office/officeart/2005/8/layout/cycle6"/>
-    <dgm:cxn modelId="{64F7D4B6-7D7A-4FA7-9949-681F6343501B}" type="presOf" srcId="{C4706D54-E470-4E18-9B74-D6DD76F800BF}" destId="{202054EF-3964-4EA6-8AF4-B8F64BC3B7BF}" srcOrd="0" destOrd="0" presId="urn:microsoft.com/office/officeart/2005/8/layout/cycle6"/>
-    <dgm:cxn modelId="{55C8C507-DED5-4A10-A503-4575EA51AA28}" srcId="{9B68D3FB-C94B-42C0-9C5C-84AD74BF3E3D}" destId="{6BF80D2C-87ED-4B30-98D6-97E7C3395772}" srcOrd="1" destOrd="0" parTransId="{9E2701F6-744A-4D1D-BEF1-918641DD5A21}" sibTransId="{F57BDE71-A3CA-4D28-A6BB-808300EFDE0A}"/>
-    <dgm:cxn modelId="{93D6071F-180C-4C74-96C2-4D1FA49DC6BB}" srcId="{9B68D3FB-C94B-42C0-9C5C-84AD74BF3E3D}" destId="{ABD2D057-7FDD-4905-81A8-340D42A7B283}" srcOrd="2" destOrd="0" parTransId="{537CA6FF-34FE-4940-9753-3B7960C88F63}" sibTransId="{C4706D54-E470-4E18-9B74-D6DD76F800BF}"/>
     <dgm:cxn modelId="{8C11DAE0-55B0-435A-BB0B-563685F32E9C}" type="presParOf" srcId="{FDFF09C0-5AFF-4BCE-988C-B1D6A5E396A2}" destId="{21E17367-BCF7-4605-8FD6-67CA1BAB99CB}" srcOrd="0" destOrd="0" presId="urn:microsoft.com/office/officeart/2005/8/layout/cycle6"/>
     <dgm:cxn modelId="{BEC99C62-25C1-4F75-9F0E-13B728EBD80B}" type="presParOf" srcId="{FDFF09C0-5AFF-4BCE-988C-B1D6A5E396A2}" destId="{8C82EF71-C116-4EE4-B3F4-5F092E748FF5}" srcOrd="1" destOrd="0" presId="urn:microsoft.com/office/officeart/2005/8/layout/cycle6"/>
     <dgm:cxn modelId="{CDEE68AB-038D-41E9-8D1D-FE77E13EEA9E}" type="presParOf" srcId="{FDFF09C0-5AFF-4BCE-988C-B1D6A5E396A2}" destId="{E10F037C-B19B-4558-82A2-B024110294FC}" srcOrd="2" destOrd="0" presId="urn:microsoft.com/office/officeart/2005/8/layout/cycle6"/>
@@ -4339,7 +4315,7 @@
   <dgm:whole/>
   <dgm:extLst>
     <a:ext uri="http://schemas.microsoft.com/office/drawing/2008/diagram">
-      <dsp:dataModelExt xmlns:dsp="http://schemas.microsoft.com/office/drawing/2008/diagram" relId="rId10" minVer="http://schemas.openxmlformats.org/drawingml/2006/diagram"/>
+      <dsp:dataModelExt xmlns:dsp="http://schemas.microsoft.com/office/drawing/2008/diagram" relId="rId7" minVer="http://schemas.openxmlformats.org/drawingml/2006/diagram"/>
     </a:ext>
   </dgm:extLst>
 </dgm:dataModel>
@@ -4349,7 +4325,7 @@
 <dgm:dataModel xmlns:dgm="http://schemas.openxmlformats.org/drawingml/2006/diagram" xmlns:a="http://schemas.openxmlformats.org/drawingml/2006/main">
   <dgm:ptLst>
     <dgm:pt modelId="{6BA166A1-1075-41C8-A1AE-25EBA638670B}" type="doc">
-      <dgm:prSet loTypeId="urn:microsoft.com/office/officeart/2005/8/layout/chevron2" loCatId="list" qsTypeId="urn:microsoft.com/office/officeart/2005/8/quickstyle/3d2" qsCatId="3D" csTypeId="urn:microsoft.com/office/officeart/2005/8/colors/colorful1" csCatId="colorful" phldr="1"/>
+      <dgm:prSet loTypeId="urn:microsoft.com/office/officeart/2005/8/layout/chevron2" loCatId="list" qsTypeId="urn:microsoft.com/office/officeart/2005/8/quickstyle/3d2" qsCatId="3D" csTypeId="urn:microsoft.com/office/officeart/2005/8/colors/colorful1#1" csCatId="colorful" phldr="1"/>
       <dgm:spPr/>
       <dgm:t>
         <a:bodyPr/>
@@ -4590,7 +4566,7 @@
         <a:p>
           <a:r>
             <a:rPr lang="es-AR" dirty="0" smtClean="0"/>
-            <a:t>Potenciales individuales</a:t>
+            <a:t>Potencial individuales</a:t>
           </a:r>
           <a:endParaRPr lang="es-AR" dirty="0"/>
         </a:p>
@@ -5332,23 +5308,7 @@
           </a:pPr>
           <a:r>
             <a:rPr lang="es-AR" sz="2100" kern="1200" dirty="0" smtClean="0"/>
-            <a:t>Descripción de </a:t>
-          </a:r>
-          <a:r>
-            <a:rPr lang="es-AR" sz="2100" kern="1200" dirty="0" err="1" smtClean="0"/>
-            <a:t>User</a:t>
-          </a:r>
-          <a:r>
-            <a:rPr lang="es-AR" sz="2100" kern="1200" dirty="0" smtClean="0"/>
-            <a:t> </a:t>
-          </a:r>
-          <a:r>
-            <a:rPr lang="es-AR" sz="2100" kern="1200" dirty="0" err="1" smtClean="0"/>
-            <a:t>Stories</a:t>
-          </a:r>
-          <a:r>
-            <a:rPr lang="es-AR" sz="2100" kern="1200" dirty="0" smtClean="0"/>
-            <a:t> para Trabajar</a:t>
+            <a:t>Descripción de User Stories para Trabajar</a:t>
           </a:r>
           <a:endParaRPr lang="es-AR" sz="2100" kern="1200" dirty="0"/>
         </a:p>
@@ -5653,12 +5613,8 @@
             </a:spcAft>
           </a:pPr>
           <a:r>
-            <a:rPr lang="es-AR" sz="1900" kern="1200" dirty="0" err="1" smtClean="0"/>
-            <a:t>ScrumUP</a:t>
-          </a:r>
-          <a:r>
             <a:rPr lang="es-AR" sz="1900" kern="1200" dirty="0" smtClean="0"/>
-            <a:t>: Soporte al Diseño</a:t>
+            <a:t>ScrumUP: Soporte al Diseño</a:t>
           </a:r>
           <a:endParaRPr lang="es-AR" sz="1900" kern="1200" dirty="0"/>
         </a:p>
@@ -5731,12 +5687,8 @@
             </a:spcAft>
           </a:pPr>
           <a:r>
-            <a:rPr lang="es-AR" sz="1900" kern="1200" dirty="0" err="1" smtClean="0"/>
-            <a:t>Version</a:t>
-          </a:r>
-          <a:r>
             <a:rPr lang="es-AR" sz="1900" kern="1200" dirty="0" smtClean="0"/>
-            <a:t> </a:t>
+            <a:t>Version </a:t>
           </a:r>
           <a:r>
             <a:rPr lang="es-AR" sz="1900" kern="1200" dirty="0" err="1" smtClean="0"/>
@@ -6252,7 +6204,7 @@
           </a:pPr>
           <a:r>
             <a:rPr lang="es-AR" sz="6500" kern="1200" dirty="0" smtClean="0"/>
-            <a:t>Comunicación</a:t>
+            <a:t>Comunicación y sinergia</a:t>
           </a:r>
           <a:endParaRPr lang="es-AR" sz="6500" kern="1200" dirty="0"/>
         </a:p>
@@ -7388,7 +7340,7 @@
           </a:pPr>
           <a:r>
             <a:rPr lang="es-AR" sz="6200" kern="1200" dirty="0" smtClean="0"/>
-            <a:t>Potenciales individuales</a:t>
+            <a:t>Potencial individuales</a:t>
           </a:r>
           <a:endParaRPr lang="es-AR" sz="6200" kern="1200" dirty="0"/>
         </a:p>
@@ -13919,7 +13871,7 @@
             </a:lvl1pPr>
           </a:lstStyle>
           <a:p>
-            <a:endParaRPr lang="es-AR"/>
+            <a:endParaRPr lang="es-AR" dirty="0"/>
           </a:p>
         </p:txBody>
       </p:sp>
@@ -13953,9 +13905,9 @@
             <a:fld id="{BAB75FFF-D2AC-4637-A3CB-1990827108E3}" type="datetimeFigureOut">
               <a:rPr lang="es-AR" smtClean="0"/>
               <a:pPr/>
-              <a:t>22/08/2011</a:t>
+              <a:t>23/08/2011</a:t>
             </a:fld>
-            <a:endParaRPr lang="es-AR"/>
+            <a:endParaRPr lang="es-AR" dirty="0"/>
           </a:p>
         </p:txBody>
       </p:sp>
@@ -13988,7 +13940,7 @@
           <a:bodyPr vert="horz" lIns="91440" tIns="45720" rIns="91440" bIns="45720" rtlCol="0" anchor="ctr"/>
           <a:lstStyle/>
           <a:p>
-            <a:endParaRPr lang="es-AR"/>
+            <a:endParaRPr lang="es-AR" dirty="0"/>
           </a:p>
         </p:txBody>
       </p:sp>
@@ -14079,7 +14031,7 @@
             </a:lvl1pPr>
           </a:lstStyle>
           <a:p>
-            <a:endParaRPr lang="es-AR"/>
+            <a:endParaRPr lang="es-AR" dirty="0"/>
           </a:p>
         </p:txBody>
       </p:sp>
@@ -14115,7 +14067,7 @@
               <a:pPr/>
               <a:t>‹Nº›</a:t>
             </a:fld>
-            <a:endParaRPr lang="es-AR"/>
+            <a:endParaRPr lang="es-AR" dirty="0"/>
           </a:p>
         </p:txBody>
       </p:sp>
@@ -14383,23 +14335,7 @@
             <a:pPr lvl="0"/>
             <a:r>
               <a:rPr lang="es-ES" sz="1200" dirty="0" smtClean="0"/>
-              <a:t>Tenga en cuenta que los asistentes imprimirán en blanco y negro o </a:t>
-            </a:r>
-            <a:r>
-              <a:rPr lang="es-ES" sz="1200" dirty="0" err="1" smtClean="0"/>
-              <a:t>escala de grises</a:t>
-            </a:r>
-            <a:r>
-              <a:rPr lang="es-ES" sz="1200" dirty="0" smtClean="0"/>
-              <a:t>. Ejecute una prueba de impresión para asegurarse de que los colores son los correctos cuando se imprime en blanco y negro puros y </a:t>
-            </a:r>
-            <a:r>
-              <a:rPr lang="es-ES" sz="1200" dirty="0" err="1" smtClean="0"/>
-              <a:t>escala de grises</a:t>
-            </a:r>
-            <a:r>
-              <a:rPr lang="es-ES" sz="1200" dirty="0" smtClean="0"/>
-              <a:t>.</a:t>
+              <a:t>Tenga en cuenta que los asistentes imprimirán en blanco y negro o escala de grises. Ejecute una prueba de impresión para asegurarse de que los colores son los correctos cuando se imprime en blanco y negro puros y escala de grises.</a:t>
             </a:r>
           </a:p>
           <a:p>
@@ -14464,7 +14400,7 @@
               <a:pPr/>
               <a:t>1</a:t>
             </a:fld>
-            <a:endParaRPr lang="es-ES"/>
+            <a:endParaRPr lang="es-ES" dirty="0"/>
           </a:p>
         </p:txBody>
       </p:sp>
@@ -14744,7 +14680,7 @@
               <a:pPr/>
               <a:t>2</a:t>
             </a:fld>
-            <a:endParaRPr>
+            <a:endParaRPr dirty="0">
               <a:solidFill>
                 <a:prstClr val="black"/>
               </a:solidFill>
@@ -14880,7 +14816,7 @@
               <a:pPr/>
               <a:t>3</a:t>
             </a:fld>
-            <a:endParaRPr>
+            <a:endParaRPr dirty="0">
               <a:solidFill>
                 <a:prstClr val="black"/>
               </a:solidFill>
@@ -15001,7 +14937,7 @@
               <a:pPr/>
               <a:t>4</a:t>
             </a:fld>
-            <a:endParaRPr>
+            <a:endParaRPr dirty="0">
               <a:solidFill>
                 <a:prstClr val="black"/>
               </a:solidFill>
@@ -15332,7 +15268,7 @@
               <a:pPr/>
               <a:t>8</a:t>
             </a:fld>
-            <a:endParaRPr lang="es-AR"/>
+            <a:endParaRPr lang="es-AR" dirty="0"/>
           </a:p>
         </p:txBody>
       </p:sp>
@@ -15683,9 +15619,9 @@
             <a:fld id="{F938E335-1C9D-42D4-948D-286329016120}" type="datetimeFigureOut">
               <a:rPr lang="es-AR" smtClean="0"/>
               <a:pPr/>
-              <a:t>22/08/2011</a:t>
+              <a:t>23/08/2011</a:t>
             </a:fld>
-            <a:endParaRPr lang="es-AR"/>
+            <a:endParaRPr lang="es-AR" dirty="0"/>
           </a:p>
         </p:txBody>
       </p:sp>
@@ -15704,7 +15640,7 @@
           <a:bodyPr/>
           <a:lstStyle/>
           <a:p>
-            <a:endParaRPr lang="es-AR"/>
+            <a:endParaRPr lang="es-AR" dirty="0"/>
           </a:p>
         </p:txBody>
       </p:sp>
@@ -15728,7 +15664,7 @@
               <a:pPr/>
               <a:t>‹Nº›</a:t>
             </a:fld>
-            <a:endParaRPr lang="es-AR"/>
+            <a:endParaRPr lang="es-AR" dirty="0"/>
           </a:p>
         </p:txBody>
       </p:sp>
@@ -15855,9 +15791,9 @@
             <a:fld id="{F938E335-1C9D-42D4-948D-286329016120}" type="datetimeFigureOut">
               <a:rPr lang="es-AR" smtClean="0"/>
               <a:pPr/>
-              <a:t>22/08/2011</a:t>
+              <a:t>23/08/2011</a:t>
             </a:fld>
-            <a:endParaRPr lang="es-AR"/>
+            <a:endParaRPr lang="es-AR" dirty="0"/>
           </a:p>
         </p:txBody>
       </p:sp>
@@ -15876,7 +15812,7 @@
           <a:bodyPr/>
           <a:lstStyle/>
           <a:p>
-            <a:endParaRPr lang="es-AR"/>
+            <a:endParaRPr lang="es-AR" dirty="0"/>
           </a:p>
         </p:txBody>
       </p:sp>
@@ -15900,7 +15836,7 @@
               <a:pPr/>
               <a:t>‹Nº›</a:t>
             </a:fld>
-            <a:endParaRPr lang="es-AR"/>
+            <a:endParaRPr lang="es-AR" dirty="0"/>
           </a:p>
         </p:txBody>
       </p:sp>
@@ -16037,9 +15973,9 @@
             <a:fld id="{F938E335-1C9D-42D4-948D-286329016120}" type="datetimeFigureOut">
               <a:rPr lang="es-AR" smtClean="0"/>
               <a:pPr/>
-              <a:t>22/08/2011</a:t>
+              <a:t>23/08/2011</a:t>
             </a:fld>
-            <a:endParaRPr lang="es-AR"/>
+            <a:endParaRPr lang="es-AR" dirty="0"/>
           </a:p>
         </p:txBody>
       </p:sp>
@@ -16058,7 +15994,7 @@
           <a:bodyPr/>
           <a:lstStyle/>
           <a:p>
-            <a:endParaRPr lang="es-AR"/>
+            <a:endParaRPr lang="es-AR" dirty="0"/>
           </a:p>
         </p:txBody>
       </p:sp>
@@ -16082,7 +16018,7 @@
               <a:pPr/>
               <a:t>‹Nº›</a:t>
             </a:fld>
-            <a:endParaRPr lang="es-AR"/>
+            <a:endParaRPr lang="es-AR" dirty="0"/>
           </a:p>
         </p:txBody>
       </p:sp>
@@ -16358,7 +16294,7 @@
           </a:lstStyle>
           <a:p>
             <a:r>
-              <a:rPr kumimoji="0" lang="es-ES"/>
+              <a:rPr kumimoji="0" lang="es-ES" dirty="0"/>
               <a:t>Logotipo de la compañía</a:t>
             </a:r>
           </a:p>
@@ -16772,7 +16708,7 @@
           </a:lstStyle>
           <a:p>
             <a:r>
-              <a:rPr kumimoji="0" lang="es-ES"/>
+              <a:rPr kumimoji="0" lang="es-ES" dirty="0"/>
               <a:t>Logotipo de la compañía</a:t>
             </a:r>
           </a:p>
@@ -17063,7 +16999,7 @@
               <a:pPr/>
               <a:t>12/17/2009</a:t>
             </a:fld>
-            <a:endParaRPr>
+            <a:endParaRPr dirty="0">
               <a:solidFill>
                 <a:prstClr val="black">
                   <a:tint val="75000"/>
@@ -17088,7 +17024,7 @@
           <a:bodyPr/>
           <a:lstStyle/>
           <a:p>
-            <a:endParaRPr>
+            <a:endParaRPr dirty="0">
               <a:solidFill>
                 <a:prstClr val="black">
                   <a:tint val="75000"/>
@@ -17124,7 +17060,7 @@
               <a:pPr/>
               <a:t>‹Nº›</a:t>
             </a:fld>
-            <a:endParaRPr>
+            <a:endParaRPr dirty="0">
               <a:solidFill>
                 <a:prstClr val="black">
                   <a:tint val="75000"/>
@@ -17162,7 +17098,7 @@
           </a:lstStyle>
           <a:p>
             <a:r>
-              <a:rPr kumimoji="0" lang="es-ES"/>
+              <a:rPr kumimoji="0" lang="es-ES" dirty="0"/>
               <a:t>Logotipo de la compañía</a:t>
             </a:r>
           </a:p>
@@ -17320,25 +17256,6 @@
 <file path=ppt/slideLayouts/slideLayout15.xml><?xml version="1.0" encoding="utf-8"?>
 <p:sldLayout xmlns:a="http://schemas.openxmlformats.org/drawingml/2006/main" xmlns:r="http://schemas.openxmlformats.org/officeDocument/2006/relationships" xmlns:p="http://schemas.openxmlformats.org/presentationml/2006/main" preserve="1" userDrawn="1">
   <p:cSld name="Título y contenido">
-    <p:bg>
-      <p:bgPr>
-        <a:blipFill dpi="0" rotWithShape="1">
-          <a:blip r:embed="rId2" cstate="email">
-            <a:lum/>
-            <a:extLst>
-              <a:ext uri="{28A0092B-C50C-407E-A947-70E740481C1C}">
-                <a14:useLocalDpi xmlns:a14="http://schemas.microsoft.com/office/drawing/2010/main"/>
-              </a:ext>
-            </a:extLst>
-          </a:blip>
-          <a:srcRect/>
-          <a:stretch>
-            <a:fillRect/>
-          </a:stretch>
-        </a:blipFill>
-        <a:effectLst/>
-      </p:bgPr>
-    </p:bg>
     <p:spTree>
       <p:nvGrpSpPr>
         <p:cNvPr id="1" name=""/>
@@ -17495,7 +17412,7 @@
               <a:pPr/>
               <a:t>12/17/2009</a:t>
             </a:fld>
-            <a:endParaRPr>
+            <a:endParaRPr dirty="0">
               <a:solidFill>
                 <a:prstClr val="black">
                   <a:tint val="75000"/>
@@ -17520,7 +17437,7 @@
           <a:bodyPr/>
           <a:lstStyle/>
           <a:p>
-            <a:endParaRPr>
+            <a:endParaRPr dirty="0">
               <a:solidFill>
                 <a:prstClr val="black">
                   <a:tint val="75000"/>
@@ -17561,7 +17478,7 @@
               <a:pPr/>
               <a:t>‹Nº›</a:t>
             </a:fld>
-            <a:endParaRPr>
+            <a:endParaRPr dirty="0">
               <a:solidFill>
                 <a:prstClr val="black">
                   <a:tint val="75000"/>
@@ -17831,7 +17748,7 @@
               <a:pPr/>
               <a:t>12/17/2009</a:t>
             </a:fld>
-            <a:endParaRPr>
+            <a:endParaRPr dirty="0">
               <a:solidFill>
                 <a:prstClr val="black">
                   <a:tint val="75000"/>
@@ -17856,7 +17773,7 @@
           <a:bodyPr/>
           <a:lstStyle/>
           <a:p>
-            <a:endParaRPr>
+            <a:endParaRPr dirty="0">
               <a:solidFill>
                 <a:prstClr val="black">
                   <a:tint val="75000"/>
@@ -17892,7 +17809,7 @@
               <a:pPr/>
               <a:t>‹Nº›</a:t>
             </a:fld>
-            <a:endParaRPr>
+            <a:endParaRPr dirty="0">
               <a:solidFill>
                 <a:prstClr val="black">
                   <a:tint val="75000"/>
@@ -18296,7 +18213,7 @@
               <a:pPr/>
               <a:t>12/17/2009</a:t>
             </a:fld>
-            <a:endParaRPr>
+            <a:endParaRPr dirty="0">
               <a:solidFill>
                 <a:prstClr val="black">
                   <a:tint val="75000"/>
@@ -18321,7 +18238,7 @@
           <a:bodyPr/>
           <a:lstStyle/>
           <a:p>
-            <a:endParaRPr>
+            <a:endParaRPr dirty="0">
               <a:solidFill>
                 <a:prstClr val="black">
                   <a:tint val="75000"/>
@@ -18357,7 +18274,7 @@
               <a:pPr/>
               <a:t>‹Nº›</a:t>
             </a:fld>
-            <a:endParaRPr>
+            <a:endParaRPr dirty="0">
               <a:solidFill>
                 <a:prstClr val="black">
                   <a:tint val="75000"/>
@@ -18609,7 +18526,7 @@
               <a:pPr/>
               <a:t>12/17/2009</a:t>
             </a:fld>
-            <a:endParaRPr>
+            <a:endParaRPr dirty="0">
               <a:solidFill>
                 <a:prstClr val="black">
                   <a:tint val="75000"/>
@@ -18634,7 +18551,7 @@
           <a:bodyPr/>
           <a:lstStyle/>
           <a:p>
-            <a:endParaRPr>
+            <a:endParaRPr dirty="0">
               <a:solidFill>
                 <a:prstClr val="black">
                   <a:tint val="75000"/>
@@ -18670,7 +18587,7 @@
               <a:pPr/>
               <a:t>‹Nº›</a:t>
             </a:fld>
-            <a:endParaRPr>
+            <a:endParaRPr dirty="0">
               <a:solidFill>
                 <a:prstClr val="black">
                   <a:tint val="75000"/>
@@ -18812,10 +18729,10 @@
           <a:p>
             <a:pPr eaLnBrk="1" latinLnBrk="0" hangingPunct="1"/>
             <a:r>
-              <a:rPr lang="es-ES" smtClean="0"/>
+              <a:rPr lang="es-ES" dirty="0" smtClean="0"/>
               <a:t>Haga clic en el icono para agregar una imagen</a:t>
             </a:r>
-            <a:endParaRPr/>
+            <a:endParaRPr dirty="0"/>
           </a:p>
         </p:txBody>
       </p:sp>
@@ -18910,7 +18827,7 @@
               <a:pPr/>
               <a:t>12/17/2009</a:t>
             </a:fld>
-            <a:endParaRPr>
+            <a:endParaRPr dirty="0">
               <a:solidFill>
                 <a:prstClr val="black">
                   <a:tint val="75000"/>
@@ -18935,7 +18852,7 @@
           <a:bodyPr/>
           <a:lstStyle/>
           <a:p>
-            <a:endParaRPr>
+            <a:endParaRPr dirty="0">
               <a:solidFill>
                 <a:prstClr val="black">
                   <a:tint val="75000"/>
@@ -18971,7 +18888,7 @@
               <a:pPr/>
               <a:t>‹Nº›</a:t>
             </a:fld>
-            <a:endParaRPr>
+            <a:endParaRPr dirty="0">
               <a:solidFill>
                 <a:prstClr val="black">
                   <a:tint val="75000"/>
@@ -19107,9 +19024,9 @@
             <a:fld id="{F938E335-1C9D-42D4-948D-286329016120}" type="datetimeFigureOut">
               <a:rPr lang="es-AR" smtClean="0"/>
               <a:pPr/>
-              <a:t>22/08/2011</a:t>
+              <a:t>23/08/2011</a:t>
             </a:fld>
-            <a:endParaRPr lang="es-AR"/>
+            <a:endParaRPr lang="es-AR" dirty="0"/>
           </a:p>
         </p:txBody>
       </p:sp>
@@ -19128,7 +19045,7 @@
           <a:bodyPr/>
           <a:lstStyle/>
           <a:p>
-            <a:endParaRPr lang="es-AR"/>
+            <a:endParaRPr lang="es-AR" dirty="0"/>
           </a:p>
         </p:txBody>
       </p:sp>
@@ -19152,7 +19069,7 @@
               <a:pPr/>
               <a:t>‹Nº›</a:t>
             </a:fld>
-            <a:endParaRPr lang="es-AR"/>
+            <a:endParaRPr lang="es-AR" dirty="0"/>
           </a:p>
         </p:txBody>
       </p:sp>
@@ -19288,7 +19205,7 @@
               <a:pPr/>
               <a:t>12/17/2009</a:t>
             </a:fld>
-            <a:endParaRPr>
+            <a:endParaRPr dirty="0">
               <a:solidFill>
                 <a:prstClr val="black">
                   <a:tint val="75000"/>
@@ -19313,7 +19230,7 @@
           <a:bodyPr/>
           <a:lstStyle/>
           <a:p>
-            <a:endParaRPr>
+            <a:endParaRPr dirty="0">
               <a:solidFill>
                 <a:prstClr val="black">
                   <a:tint val="75000"/>
@@ -19349,7 +19266,7 @@
               <a:pPr/>
               <a:t>‹Nº›</a:t>
             </a:fld>
-            <a:endParaRPr>
+            <a:endParaRPr dirty="0">
               <a:solidFill>
                 <a:prstClr val="black">
                   <a:tint val="75000"/>
@@ -19504,7 +19421,7 @@
               <a:pPr/>
               <a:t>12/17/2009</a:t>
             </a:fld>
-            <a:endParaRPr>
+            <a:endParaRPr dirty="0">
               <a:solidFill>
                 <a:prstClr val="black">
                   <a:tint val="75000"/>
@@ -19529,7 +19446,7 @@
           <a:bodyPr/>
           <a:lstStyle/>
           <a:p>
-            <a:endParaRPr>
+            <a:endParaRPr dirty="0">
               <a:solidFill>
                 <a:prstClr val="black">
                   <a:tint val="75000"/>
@@ -19565,7 +19482,7 @@
               <a:pPr/>
               <a:t>‹Nº›</a:t>
             </a:fld>
-            <a:endParaRPr>
+            <a:endParaRPr dirty="0">
               <a:solidFill>
                 <a:prstClr val="black">
                   <a:tint val="75000"/>
@@ -19658,7 +19575,7 @@
               <a:pPr/>
               <a:t>12/17/2009</a:t>
             </a:fld>
-            <a:endParaRPr>
+            <a:endParaRPr dirty="0">
               <a:solidFill>
                 <a:prstClr val="black">
                   <a:tint val="75000"/>
@@ -19683,7 +19600,7 @@
           <a:bodyPr/>
           <a:lstStyle/>
           <a:p>
-            <a:endParaRPr>
+            <a:endParaRPr dirty="0">
               <a:solidFill>
                 <a:prstClr val="black">
                   <a:tint val="75000"/>
@@ -19719,7 +19636,7 @@
               <a:pPr/>
               <a:t>‹Nº›</a:t>
             </a:fld>
-            <a:endParaRPr>
+            <a:endParaRPr dirty="0">
               <a:solidFill>
                 <a:prstClr val="black">
                   <a:tint val="75000"/>
@@ -19795,7 +19712,7 @@
               <a:pPr/>
               <a:t>12/17/2009</a:t>
             </a:fld>
-            <a:endParaRPr>
+            <a:endParaRPr dirty="0">
               <a:solidFill>
                 <a:prstClr val="black">
                   <a:tint val="75000"/>
@@ -19820,7 +19737,7 @@
           <a:bodyPr/>
           <a:lstStyle/>
           <a:p>
-            <a:endParaRPr>
+            <a:endParaRPr dirty="0">
               <a:solidFill>
                 <a:prstClr val="black">
                   <a:tint val="75000"/>
@@ -19856,7 +19773,7 @@
               <a:pPr/>
               <a:t>‹Nº›</a:t>
             </a:fld>
-            <a:endParaRPr>
+            <a:endParaRPr dirty="0">
               <a:solidFill>
                 <a:prstClr val="black">
                   <a:tint val="75000"/>
@@ -19966,7 +19883,7 @@
               <a:pPr/>
               <a:t>12/17/2009</a:t>
             </a:fld>
-            <a:endParaRPr>
+            <a:endParaRPr dirty="0">
               <a:solidFill>
                 <a:prstClr val="black">
                   <a:tint val="75000"/>
@@ -19996,7 +19913,7 @@
           <a:bodyPr/>
           <a:lstStyle/>
           <a:p>
-            <a:endParaRPr>
+            <a:endParaRPr dirty="0">
               <a:solidFill>
                 <a:prstClr val="black">
                   <a:tint val="75000"/>
@@ -20037,7 +19954,7 @@
               <a:pPr/>
               <a:t>‹Nº›</a:t>
             </a:fld>
-            <a:endParaRPr>
+            <a:endParaRPr dirty="0">
               <a:solidFill>
                 <a:prstClr val="black">
                   <a:tint val="75000"/>
@@ -20329,7 +20246,7 @@
           </a:lstStyle>
           <a:p>
             <a:r>
-              <a:rPr kumimoji="0" lang="es-ES"/>
+              <a:rPr kumimoji="0" lang="es-ES" dirty="0"/>
               <a:t>Logotipo de la compañía</a:t>
             </a:r>
           </a:p>
@@ -20482,25 +20399,6 @@
 <file path=ppt/slideLayouts/slideLayout26.xml><?xml version="1.0" encoding="utf-8"?>
 <p:sldLayout xmlns:a="http://schemas.openxmlformats.org/drawingml/2006/main" xmlns:r="http://schemas.openxmlformats.org/officeDocument/2006/relationships" xmlns:p="http://schemas.openxmlformats.org/presentationml/2006/main" userDrawn="1">
   <p:cSld name="1_Título y contenido">
-    <p:bg>
-      <p:bgPr>
-        <a:blipFill dpi="0" rotWithShape="1">
-          <a:blip r:embed="rId2" cstate="email">
-            <a:lum/>
-            <a:extLst>
-              <a:ext uri="{28A0092B-C50C-407E-A947-70E740481C1C}">
-                <a14:useLocalDpi xmlns:a14="http://schemas.microsoft.com/office/drawing/2010/main"/>
-              </a:ext>
-            </a:extLst>
-          </a:blip>
-          <a:srcRect/>
-          <a:stretch>
-            <a:fillRect/>
-          </a:stretch>
-        </a:blipFill>
-        <a:effectLst/>
-      </p:bgPr>
-    </p:bg>
     <p:spTree>
       <p:nvGrpSpPr>
         <p:cNvPr id="1" name=""/>
@@ -20651,7 +20549,7 @@
               <a:pPr/>
               <a:t>12/17/2009</a:t>
             </a:fld>
-            <a:endParaRPr kumimoji="0" lang="es-ES"/>
+            <a:endParaRPr kumimoji="0" lang="es-ES" dirty="0"/>
           </a:p>
         </p:txBody>
       </p:sp>
@@ -20670,7 +20568,7 @@
           <a:bodyPr/>
           <a:lstStyle/>
           <a:p>
-            <a:endParaRPr kumimoji="0" lang="es-ES"/>
+            <a:endParaRPr kumimoji="0" lang="es-ES" dirty="0"/>
           </a:p>
         </p:txBody>
       </p:sp>
@@ -20699,7 +20597,7 @@
               <a:pPr/>
               <a:t>‹Nº›</a:t>
             </a:fld>
-            <a:endParaRPr kumimoji="0" lang="es-ES"/>
+            <a:endParaRPr kumimoji="0" lang="es-ES" dirty="0"/>
           </a:p>
         </p:txBody>
       </p:sp>
@@ -20907,9 +20805,9 @@
             <a:fld id="{F938E335-1C9D-42D4-948D-286329016120}" type="datetimeFigureOut">
               <a:rPr lang="es-AR" smtClean="0"/>
               <a:pPr/>
-              <a:t>22/08/2011</a:t>
+              <a:t>23/08/2011</a:t>
             </a:fld>
-            <a:endParaRPr lang="es-AR"/>
+            <a:endParaRPr lang="es-AR" dirty="0"/>
           </a:p>
         </p:txBody>
       </p:sp>
@@ -20928,7 +20826,7 @@
           <a:bodyPr/>
           <a:lstStyle/>
           <a:p>
-            <a:endParaRPr lang="es-AR"/>
+            <a:endParaRPr lang="es-AR" dirty="0"/>
           </a:p>
         </p:txBody>
       </p:sp>
@@ -20952,7 +20850,7 @@
               <a:pPr/>
               <a:t>‹Nº›</a:t>
             </a:fld>
-            <a:endParaRPr lang="es-AR"/>
+            <a:endParaRPr lang="es-AR" dirty="0"/>
           </a:p>
         </p:txBody>
       </p:sp>
@@ -21197,9 +21095,9 @@
             <a:fld id="{F938E335-1C9D-42D4-948D-286329016120}" type="datetimeFigureOut">
               <a:rPr lang="es-AR" smtClean="0"/>
               <a:pPr/>
-              <a:t>22/08/2011</a:t>
+              <a:t>23/08/2011</a:t>
             </a:fld>
-            <a:endParaRPr lang="es-AR"/>
+            <a:endParaRPr lang="es-AR" dirty="0"/>
           </a:p>
         </p:txBody>
       </p:sp>
@@ -21218,7 +21116,7 @@
           <a:bodyPr/>
           <a:lstStyle/>
           <a:p>
-            <a:endParaRPr lang="es-AR"/>
+            <a:endParaRPr lang="es-AR" dirty="0"/>
           </a:p>
         </p:txBody>
       </p:sp>
@@ -21242,7 +21140,7 @@
               <a:pPr/>
               <a:t>‹Nº›</a:t>
             </a:fld>
-            <a:endParaRPr lang="es-AR"/>
+            <a:endParaRPr lang="es-AR" dirty="0"/>
           </a:p>
         </p:txBody>
       </p:sp>
@@ -21621,9 +21519,9 @@
             <a:fld id="{F938E335-1C9D-42D4-948D-286329016120}" type="datetimeFigureOut">
               <a:rPr lang="es-AR" smtClean="0"/>
               <a:pPr/>
-              <a:t>22/08/2011</a:t>
+              <a:t>23/08/2011</a:t>
             </a:fld>
-            <a:endParaRPr lang="es-AR"/>
+            <a:endParaRPr lang="es-AR" dirty="0"/>
           </a:p>
         </p:txBody>
       </p:sp>
@@ -21642,7 +21540,7 @@
           <a:bodyPr/>
           <a:lstStyle/>
           <a:p>
-            <a:endParaRPr lang="es-AR"/>
+            <a:endParaRPr lang="es-AR" dirty="0"/>
           </a:p>
         </p:txBody>
       </p:sp>
@@ -21666,7 +21564,7 @@
               <a:pPr/>
               <a:t>‹Nº›</a:t>
             </a:fld>
-            <a:endParaRPr lang="es-AR"/>
+            <a:endParaRPr lang="es-AR" dirty="0"/>
           </a:p>
         </p:txBody>
       </p:sp>
@@ -21741,9 +21639,9 @@
             <a:fld id="{F938E335-1C9D-42D4-948D-286329016120}" type="datetimeFigureOut">
               <a:rPr lang="es-AR" smtClean="0"/>
               <a:pPr/>
-              <a:t>22/08/2011</a:t>
+              <a:t>23/08/2011</a:t>
             </a:fld>
-            <a:endParaRPr lang="es-AR"/>
+            <a:endParaRPr lang="es-AR" dirty="0"/>
           </a:p>
         </p:txBody>
       </p:sp>
@@ -21762,7 +21660,7 @@
           <a:bodyPr/>
           <a:lstStyle/>
           <a:p>
-            <a:endParaRPr lang="es-AR"/>
+            <a:endParaRPr lang="es-AR" dirty="0"/>
           </a:p>
         </p:txBody>
       </p:sp>
@@ -21786,7 +21684,7 @@
               <a:pPr/>
               <a:t>‹Nº›</a:t>
             </a:fld>
-            <a:endParaRPr lang="es-AR"/>
+            <a:endParaRPr lang="es-AR" dirty="0"/>
           </a:p>
         </p:txBody>
       </p:sp>
@@ -21838,9 +21736,9 @@
             <a:fld id="{F938E335-1C9D-42D4-948D-286329016120}" type="datetimeFigureOut">
               <a:rPr lang="es-AR" smtClean="0"/>
               <a:pPr/>
-              <a:t>22/08/2011</a:t>
+              <a:t>23/08/2011</a:t>
             </a:fld>
-            <a:endParaRPr lang="es-AR"/>
+            <a:endParaRPr lang="es-AR" dirty="0"/>
           </a:p>
         </p:txBody>
       </p:sp>
@@ -21859,7 +21757,7 @@
           <a:bodyPr/>
           <a:lstStyle/>
           <a:p>
-            <a:endParaRPr lang="es-AR"/>
+            <a:endParaRPr lang="es-AR" dirty="0"/>
           </a:p>
         </p:txBody>
       </p:sp>
@@ -21883,7 +21781,7 @@
               <a:pPr/>
               <a:t>‹Nº›</a:t>
             </a:fld>
-            <a:endParaRPr lang="es-AR"/>
+            <a:endParaRPr lang="es-AR" dirty="0"/>
           </a:p>
         </p:txBody>
       </p:sp>
@@ -22117,9 +22015,9 @@
             <a:fld id="{F938E335-1C9D-42D4-948D-286329016120}" type="datetimeFigureOut">
               <a:rPr lang="es-AR" smtClean="0"/>
               <a:pPr/>
-              <a:t>22/08/2011</a:t>
+              <a:t>23/08/2011</a:t>
             </a:fld>
-            <a:endParaRPr lang="es-AR"/>
+            <a:endParaRPr lang="es-AR" dirty="0"/>
           </a:p>
         </p:txBody>
       </p:sp>
@@ -22138,7 +22036,7 @@
           <a:bodyPr/>
           <a:lstStyle/>
           <a:p>
-            <a:endParaRPr lang="es-AR"/>
+            <a:endParaRPr lang="es-AR" dirty="0"/>
           </a:p>
         </p:txBody>
       </p:sp>
@@ -22162,7 +22060,7 @@
               <a:pPr/>
               <a:t>‹Nº›</a:t>
             </a:fld>
-            <a:endParaRPr lang="es-AR"/>
+            <a:endParaRPr lang="es-AR" dirty="0"/>
           </a:p>
         </p:txBody>
       </p:sp>
@@ -22285,7 +22183,7 @@
             </a:lvl9pPr>
           </a:lstStyle>
           <a:p>
-            <a:endParaRPr lang="es-AR"/>
+            <a:endParaRPr lang="es-AR" dirty="0"/>
           </a:p>
         </p:txBody>
       </p:sp>
@@ -22372,9 +22270,9 @@
             <a:fld id="{F938E335-1C9D-42D4-948D-286329016120}" type="datetimeFigureOut">
               <a:rPr lang="es-AR" smtClean="0"/>
               <a:pPr/>
-              <a:t>22/08/2011</a:t>
+              <a:t>23/08/2011</a:t>
             </a:fld>
-            <a:endParaRPr lang="es-AR"/>
+            <a:endParaRPr lang="es-AR" dirty="0"/>
           </a:p>
         </p:txBody>
       </p:sp>
@@ -22393,7 +22291,7 @@
           <a:bodyPr/>
           <a:lstStyle/>
           <a:p>
-            <a:endParaRPr lang="es-AR"/>
+            <a:endParaRPr lang="es-AR" dirty="0"/>
           </a:p>
         </p:txBody>
       </p:sp>
@@ -22417,7 +22315,7 @@
               <a:pPr/>
               <a:t>‹Nº›</a:t>
             </a:fld>
-            <a:endParaRPr lang="es-AR"/>
+            <a:endParaRPr lang="es-AR" dirty="0"/>
           </a:p>
         </p:txBody>
       </p:sp>
@@ -22587,9 +22485,9 @@
             <a:fld id="{F938E335-1C9D-42D4-948D-286329016120}" type="datetimeFigureOut">
               <a:rPr lang="es-AR" smtClean="0"/>
               <a:pPr/>
-              <a:t>22/08/2011</a:t>
+              <a:t>23/08/2011</a:t>
             </a:fld>
-            <a:endParaRPr lang="es-AR"/>
+            <a:endParaRPr lang="es-AR" dirty="0"/>
           </a:p>
         </p:txBody>
       </p:sp>
@@ -22626,7 +22524,7 @@
             </a:lvl1pPr>
           </a:lstStyle>
           <a:p>
-            <a:endParaRPr lang="es-AR"/>
+            <a:endParaRPr lang="es-AR" dirty="0"/>
           </a:p>
         </p:txBody>
       </p:sp>
@@ -22668,7 +22566,7 @@
               <a:pPr/>
               <a:t>‹Nº›</a:t>
             </a:fld>
-            <a:endParaRPr lang="es-AR"/>
+            <a:endParaRPr lang="es-AR" dirty="0"/>
           </a:p>
         </p:txBody>
       </p:sp>
@@ -23138,7 +23036,7 @@
               <a:pPr/>
               <a:t>12/17/2009</a:t>
             </a:fld>
-            <a:endParaRPr>
+            <a:endParaRPr dirty="0">
               <a:solidFill>
                 <a:prstClr val="black">
                   <a:tint val="75000"/>
@@ -23181,7 +23079,7 @@
             </a:lvl1pPr>
           </a:lstStyle>
           <a:p>
-            <a:endParaRPr>
+            <a:endParaRPr dirty="0">
               <a:solidFill>
                 <a:prstClr val="black">
                   <a:tint val="75000"/>
@@ -23235,7 +23133,7 @@
               <a:pPr/>
               <a:t>‹Nº›</a:t>
             </a:fld>
-            <a:endParaRPr>
+            <a:endParaRPr dirty="0">
               <a:solidFill>
                 <a:prstClr val="black">
                   <a:tint val="75000"/>
@@ -23690,11 +23588,14 @@
           </a:p>
           <a:p>
             <a:r>
-              <a:rPr lang="es-AR" sz="13200" dirty="0">
+              <a:rPr lang="es-AR" sz="13200" dirty="0" smtClean="0">
                 <a:latin typeface="+mn-lt"/>
               </a:rPr>
-              <a:t>21/06/2011</a:t>
+              <a:t>23/08/2011</a:t>
             </a:r>
+            <a:endParaRPr lang="es-AR" sz="13200" dirty="0">
+              <a:latin typeface="+mn-lt"/>
+            </a:endParaRPr>
           </a:p>
           <a:p>
             <a:endParaRPr lang="es-ES" sz="13200" dirty="0">
@@ -23893,14 +23794,6 @@
 <file path=ppt/slides/slide11.xml><?xml version="1.0" encoding="utf-8"?>
 <p:sld xmlns:a="http://schemas.openxmlformats.org/drawingml/2006/main" xmlns:r="http://schemas.openxmlformats.org/officeDocument/2006/relationships" xmlns:p="http://schemas.openxmlformats.org/presentationml/2006/main">
   <p:cSld>
-    <p:bg>
-      <p:bgPr>
-        <a:solidFill>
-          <a:srgbClr val="D5D5D5"/>
-        </a:solidFill>
-        <a:effectLst/>
-      </p:bgPr>
-    </p:bg>
     <p:spTree>
       <p:nvGrpSpPr>
         <p:cNvPr id="1" name=""/>
@@ -23961,7 +23854,7 @@
             <a:pPr algn="ctr">
               <a:defRPr/>
             </a:pPr>
-            <a:endParaRPr lang="en-US">
+            <a:endParaRPr lang="en-US" dirty="0">
               <a:solidFill>
                 <a:srgbClr val="FFFFFF"/>
               </a:solidFill>
@@ -24014,7 +23907,7 @@
             <a:pPr algn="ctr">
               <a:defRPr/>
             </a:pPr>
-            <a:endParaRPr lang="en-US">
+            <a:endParaRPr lang="en-US" dirty="0">
               <a:solidFill>
                 <a:srgbClr val="FFFFFF"/>
               </a:solidFill>
@@ -24067,7 +23960,7 @@
             <a:pPr algn="ctr">
               <a:defRPr/>
             </a:pPr>
-            <a:endParaRPr lang="en-US">
+            <a:endParaRPr lang="en-US" dirty="0">
               <a:solidFill>
                 <a:srgbClr val="FFFFFF"/>
               </a:solidFill>
@@ -24120,7 +24013,7 @@
             <a:pPr algn="ctr">
               <a:defRPr/>
             </a:pPr>
-            <a:endParaRPr lang="en-US">
+            <a:endParaRPr lang="en-US" dirty="0">
               <a:solidFill>
                 <a:srgbClr val="FFFFFF"/>
               </a:solidFill>
@@ -24173,7 +24066,7 @@
             <a:pPr algn="ctr">
               <a:defRPr/>
             </a:pPr>
-            <a:endParaRPr lang="en-US">
+            <a:endParaRPr lang="en-US" dirty="0">
               <a:solidFill>
                 <a:srgbClr val="FFFFFF"/>
               </a:solidFill>
@@ -24226,7 +24119,7 @@
             <a:pPr algn="ctr">
               <a:defRPr/>
             </a:pPr>
-            <a:endParaRPr lang="en-US">
+            <a:endParaRPr lang="en-US" dirty="0">
               <a:solidFill>
                 <a:srgbClr val="FFFFFF"/>
               </a:solidFill>
@@ -24279,7 +24172,7 @@
             <a:pPr algn="ctr">
               <a:defRPr/>
             </a:pPr>
-            <a:endParaRPr lang="en-US">
+            <a:endParaRPr lang="en-US" dirty="0">
               <a:solidFill>
                 <a:srgbClr val="FFFFFF"/>
               </a:solidFill>
@@ -24332,7 +24225,7 @@
             <a:pPr algn="ctr">
               <a:defRPr/>
             </a:pPr>
-            <a:endParaRPr lang="en-US">
+            <a:endParaRPr lang="en-US" dirty="0">
               <a:solidFill>
                 <a:srgbClr val="FFFFFF"/>
               </a:solidFill>
@@ -24385,7 +24278,7 @@
             <a:pPr algn="ctr">
               <a:defRPr/>
             </a:pPr>
-            <a:endParaRPr lang="en-US">
+            <a:endParaRPr lang="en-US" dirty="0">
               <a:solidFill>
                 <a:srgbClr val="FFFFFF"/>
               </a:solidFill>
@@ -24438,7 +24331,7 @@
             <a:pPr algn="ctr">
               <a:defRPr/>
             </a:pPr>
-            <a:endParaRPr lang="en-US">
+            <a:endParaRPr lang="en-US" dirty="0">
               <a:solidFill>
                 <a:srgbClr val="FFFFFF"/>
               </a:solidFill>
@@ -25963,7 +25856,7 @@
               <a:defRPr/>
             </a:pPr>
             <a:r>
-              <a:rPr lang="en-US" sz="2400" smtClean="0">
+              <a:rPr lang="en-US" sz="2400" dirty="0" smtClean="0">
                 <a:solidFill>
                   <a:prstClr val="white"/>
                 </a:solidFill>
@@ -26025,12 +25918,28 @@
               <a:defRPr/>
             </a:pPr>
             <a:r>
-              <a:rPr lang="en-US" sz="2400" smtClean="0">
+              <a:rPr lang="es-AR" sz="2400" dirty="0" smtClean="0">
                 <a:solidFill>
                   <a:prstClr val="white"/>
                 </a:solidFill>
               </a:rPr>
-              <a:t>Situación Actual</a:t>
+              <a:t>Situación</a:t>
+            </a:r>
+            <a:r>
+              <a:rPr lang="en-US" sz="2400" dirty="0" smtClean="0">
+                <a:solidFill>
+                  <a:prstClr val="white"/>
+                </a:solidFill>
+              </a:rPr>
+              <a:t> </a:t>
+            </a:r>
+            <a:r>
+              <a:rPr lang="en-US" sz="2400" dirty="0" smtClean="0">
+                <a:solidFill>
+                  <a:prstClr val="white"/>
+                </a:solidFill>
+              </a:rPr>
+              <a:t>Actual</a:t>
             </a:r>
             <a:endParaRPr lang="en-US" sz="2400" dirty="0">
               <a:solidFill>
@@ -26087,7 +25996,7 @@
               <a:defRPr/>
             </a:pPr>
             <a:r>
-              <a:rPr lang="en-US" sz="2400" smtClean="0">
+              <a:rPr lang="en-US" sz="2400" dirty="0" smtClean="0">
                 <a:solidFill>
                   <a:prstClr val="white"/>
                 </a:solidFill>
@@ -26149,7 +26058,7 @@
               <a:defRPr/>
             </a:pPr>
             <a:r>
-              <a:rPr lang="en-US" sz="2400" smtClean="0">
+              <a:rPr lang="en-US" sz="2400" dirty="0" smtClean="0">
                 <a:solidFill>
                   <a:prstClr val="white"/>
                 </a:solidFill>
@@ -26211,7 +26120,7 @@
               <a:defRPr/>
             </a:pPr>
             <a:r>
-              <a:rPr lang="en-US" sz="2400" smtClean="0">
+              <a:rPr lang="en-US" sz="2400" dirty="0" smtClean="0">
                 <a:solidFill>
                   <a:prstClr val="white"/>
                 </a:solidFill>
@@ -26273,7 +26182,7 @@
               <a:defRPr/>
             </a:pPr>
             <a:r>
-              <a:rPr lang="en-US" sz="2400" smtClean="0">
+              <a:rPr lang="en-US" sz="2400" dirty="0" smtClean="0">
                 <a:solidFill>
                   <a:prstClr val="white"/>
                 </a:solidFill>
@@ -26335,7 +26244,7 @@
               <a:defRPr/>
             </a:pPr>
             <a:r>
-              <a:rPr lang="en-US" sz="2400" smtClean="0">
+              <a:rPr lang="en-US" sz="2400" dirty="0" smtClean="0">
                 <a:solidFill>
                   <a:prstClr val="white"/>
                 </a:solidFill>
@@ -26397,7 +26306,7 @@
               <a:defRPr/>
             </a:pPr>
             <a:r>
-              <a:rPr lang="en-US" sz="2400" smtClean="0">
+              <a:rPr lang="en-US" sz="2400" dirty="0" smtClean="0">
                 <a:solidFill>
                   <a:prstClr val="white"/>
                 </a:solidFill>
@@ -26459,7 +26368,7 @@
               <a:defRPr/>
             </a:pPr>
             <a:r>
-              <a:rPr lang="en-US" sz="2400" smtClean="0">
+              <a:rPr lang="en-US" sz="2400" dirty="0" smtClean="0">
                 <a:solidFill>
                   <a:prstClr val="white"/>
                 </a:solidFill>
@@ -27372,13 +27281,13 @@
               </a:lnSpc>
             </a:pPr>
             <a:r>
-              <a:rPr lang="es-AR" dirty="0" err="1" smtClean="0">
+              <a:rPr lang="es-AR" dirty="0" smtClean="0">
                 <a:solidFill>
                   <a:srgbClr val="000000"/>
                 </a:solidFill>
                 <a:latin typeface="Arial" charset="0"/>
               </a:rPr>
-              <a:t>Metodologia</a:t>
+              <a:t>Metodología</a:t>
             </a:r>
             <a:endParaRPr lang="es-AR" dirty="0" smtClean="0">
               <a:solidFill>
@@ -27517,8 +27426,8 @@
         </p:nvSpPr>
         <p:spPr>
           <a:xfrm>
-            <a:off x="9701509" y="16773698"/>
-            <a:ext cx="37304610" cy="20951652"/>
+            <a:off x="7147175" y="16773698"/>
+            <a:ext cx="39858944" cy="20951652"/>
           </a:xfrm>
           <a:prstGeom prst="rect">
             <a:avLst/>
@@ -27532,12 +27441,20 @@
           <a:lstStyle/>
           <a:p>
             <a:r>
+              <a:rPr lang="es-ES" sz="39600" dirty="0" smtClean="0">
+                <a:solidFill>
+                  <a:prstClr val="black"/>
+                </a:solidFill>
+              </a:rPr>
+              <a:t>¿Donde </a:t>
+            </a:r>
+            <a:r>
               <a:rPr lang="es-ES" sz="39600" dirty="0">
                 <a:solidFill>
                   <a:prstClr val="black"/>
                 </a:solidFill>
               </a:rPr>
-              <a:t>Donde Estamos?</a:t>
+              <a:t>Estamos?</a:t>
             </a:r>
           </a:p>
         </p:txBody>
@@ -27612,6 +27529,30 @@
           <a:chExt cx="0" cy="0"/>
         </a:xfrm>
       </p:grpSpPr>
+      <p:pic>
+        <p:nvPicPr>
+          <p:cNvPr id="122" name="Picture 121" descr="Estructura Aplicación.jpg"/>
+          <p:cNvPicPr>
+            <a:picLocks noChangeAspect="1"/>
+          </p:cNvPicPr>
+          <p:nvPr/>
+        </p:nvPicPr>
+        <p:blipFill>
+          <a:blip r:embed="rId4" cstate="print"/>
+          <a:stretch>
+            <a:fillRect/>
+          </a:stretch>
+        </p:blipFill>
+        <p:spPr>
+          <a:xfrm>
+            <a:off x="40342863" y="19780102"/>
+            <a:ext cx="9629775" cy="4657726"/>
+          </a:xfrm>
+          <a:prstGeom prst="rect">
+            <a:avLst/>
+          </a:prstGeom>
+        </p:spPr>
+      </p:pic>
       <p:sp>
         <p:nvSpPr>
           <p:cNvPr id="123" name="122 Rectángulo redondeado"/>
@@ -27659,7 +27600,7 @@
           <p:nvPr/>
         </p:nvPicPr>
         <p:blipFill>
-          <a:blip r:embed="rId4" cstate="print">
+          <a:blip r:embed="rId5" cstate="print">
             <a:extLst>
               <a:ext uri="{28A0092B-C50C-407E-A947-70E740481C1C}">
                 <a14:useLocalDpi xmlns:a14="http://schemas.microsoft.com/office/drawing/2010/main" val="0"/>
@@ -27763,7 +27704,7 @@
           <a:lstStyle/>
           <a:p>
             <a:pPr algn="ctr"/>
-            <a:endParaRPr lang="es-AR"/>
+            <a:endParaRPr lang="es-AR" dirty="0"/>
           </a:p>
         </p:txBody>
       </p:sp>
@@ -27928,7 +27869,7 @@
           <a:lstStyle/>
           <a:p>
             <a:pPr algn="ctr"/>
-            <a:endParaRPr lang="es-AR"/>
+            <a:endParaRPr lang="es-AR" dirty="0"/>
           </a:p>
         </p:txBody>
       </p:sp>
@@ -28391,7 +28332,7 @@
           <a:lstStyle/>
           <a:p>
             <a:pPr algn="ctr"/>
-            <a:endParaRPr lang="es-AR"/>
+            <a:endParaRPr lang="es-AR" dirty="0"/>
           </a:p>
         </p:txBody>
       </p:sp>
@@ -28622,11 +28563,11 @@
           <p:nvPr/>
         </p:nvPicPr>
         <p:blipFill>
-          <a:blip r:embed="rId5" cstate="print">
+          <a:blip r:embed="rId6" cstate="print">
             <a:extLst>
               <a:ext uri="{BEBA8EAE-BF5A-486C-A8C5-ECC9F3942E4B}">
                 <a14:imgProps xmlns:a14="http://schemas.microsoft.com/office/drawing/2010/main">
-                  <a14:imgLayer r:embed="rId6">
+                  <a14:imgLayer r:embed="rId7">
                     <a14:imgEffect>
                       <a14:brightnessContrast bright="42000" contrast="17000"/>
                     </a14:imgEffect>
@@ -28695,7 +28636,7 @@
           <p:nvPr/>
         </p:nvPicPr>
         <p:blipFill>
-          <a:blip r:embed="rId7" cstate="print"/>
+          <a:blip r:embed="rId8" cstate="print"/>
           <a:srcRect/>
           <a:stretch>
             <a:fillRect/>
@@ -28727,7 +28668,7 @@
           <p:nvPr/>
         </p:nvPicPr>
         <p:blipFill>
-          <a:blip r:embed="rId8" cstate="print"/>
+          <a:blip r:embed="rId9" cstate="print"/>
           <a:srcRect/>
           <a:stretch>
             <a:fillRect/>
@@ -28753,7 +28694,7 @@
           <p:nvPr/>
         </p:nvPicPr>
         <p:blipFill>
-          <a:blip r:embed="rId9" cstate="print"/>
+          <a:blip r:embed="rId10" cstate="print"/>
           <a:srcRect/>
           <a:stretch>
             <a:fillRect/>
@@ -28806,7 +28747,7 @@
           <a:lstStyle/>
           <a:p>
             <a:pPr algn="ctr"/>
-            <a:endParaRPr lang="en-US"/>
+            <a:endParaRPr lang="en-US" dirty="0"/>
           </a:p>
         </p:txBody>
       </p:sp>
@@ -28846,7 +28787,7 @@
           <a:lstStyle/>
           <a:p>
             <a:pPr algn="ctr"/>
-            <a:endParaRPr lang="en-US"/>
+            <a:endParaRPr lang="en-US" dirty="0"/>
           </a:p>
         </p:txBody>
       </p:sp>
@@ -28899,7 +28840,7 @@
           <p:nvPr/>
         </p:nvPicPr>
         <p:blipFill>
-          <a:blip r:embed="rId10" cstate="print">
+          <a:blip r:embed="rId11" cstate="print">
             <a:lum bright="30000" contrast="37000"/>
           </a:blip>
           <a:srcRect/>
@@ -29036,7 +28977,7 @@
           <p:nvPr/>
         </p:nvPicPr>
         <p:blipFill>
-          <a:blip r:embed="rId11" cstate="print">
+          <a:blip r:embed="rId12" cstate="print">
             <a:extLst>
               <a:ext uri="{28A0092B-C50C-407E-A947-70E740481C1C}">
                 <a14:useLocalDpi xmlns:a14="http://schemas.microsoft.com/office/drawing/2010/main" val="0"/>
@@ -29102,7 +29043,7 @@
           <a:lstStyle/>
           <a:p>
             <a:pPr algn="ctr"/>
-            <a:endParaRPr lang="es-AR"/>
+            <a:endParaRPr lang="es-AR" dirty="0"/>
           </a:p>
         </p:txBody>
       </p:sp>
@@ -29281,14 +29222,13 @@
           <p:cNvPr id="143" name="142 Conector curvado"/>
           <p:cNvCxnSpPr>
             <a:stCxn id="26" idx="5"/>
-            <a:endCxn id="61" idx="1"/>
           </p:cNvCxnSpPr>
           <p:nvPr/>
         </p:nvCxnSpPr>
         <p:spPr>
           <a:xfrm rot="16200000" flipH="1">
-            <a:off x="39046136" y="18009429"/>
-            <a:ext cx="1912429" cy="4066019"/>
+            <a:off x="38043741" y="19011825"/>
+            <a:ext cx="2152714" cy="2301514"/>
           </a:xfrm>
           <a:prstGeom prst="curvedConnector2">
             <a:avLst/>
@@ -29358,7 +29298,7 @@
           <p:nvPr/>
         </p:nvPicPr>
         <p:blipFill>
-          <a:blip r:embed="rId12">
+          <a:blip r:embed="rId13" cstate="print">
             <a:extLst>
               <a:ext uri="{28A0092B-C50C-407E-A947-70E740481C1C}">
                 <a14:useLocalDpi xmlns:a14="http://schemas.microsoft.com/office/drawing/2010/main" val="0"/>
@@ -29373,66 +29313,6 @@
           <a:xfrm>
             <a:off x="38965616" y="10519226"/>
             <a:ext cx="6600825" cy="2638425"/>
-          </a:xfrm>
-          <a:prstGeom prst="rect">
-            <a:avLst/>
-          </a:prstGeom>
-        </p:spPr>
-      </p:pic>
-      <p:pic>
-        <p:nvPicPr>
-          <p:cNvPr id="58" name="57 Imagen"/>
-          <p:cNvPicPr>
-            <a:picLocks noChangeAspect="1"/>
-          </p:cNvPicPr>
-          <p:nvPr/>
-        </p:nvPicPr>
-        <p:blipFill>
-          <a:blip r:embed="rId13">
-            <a:extLst>
-              <a:ext uri="{28A0092B-C50C-407E-A947-70E740481C1C}">
-                <a14:useLocalDpi xmlns:a14="http://schemas.microsoft.com/office/drawing/2010/main" val="0"/>
-              </a:ext>
-            </a:extLst>
-          </a:blip>
-          <a:stretch>
-            <a:fillRect/>
-          </a:stretch>
-        </p:blipFill>
-        <p:spPr>
-          <a:xfrm>
-            <a:off x="42708941" y="13704816"/>
-            <a:ext cx="5715000" cy="4657725"/>
-          </a:xfrm>
-          <a:prstGeom prst="rect">
-            <a:avLst/>
-          </a:prstGeom>
-        </p:spPr>
-      </p:pic>
-      <p:pic>
-        <p:nvPicPr>
-          <p:cNvPr id="61" name="60 Imagen"/>
-          <p:cNvPicPr>
-            <a:picLocks noChangeAspect="1"/>
-          </p:cNvPicPr>
-          <p:nvPr/>
-        </p:nvPicPr>
-        <p:blipFill>
-          <a:blip r:embed="rId14">
-            <a:extLst>
-              <a:ext uri="{28A0092B-C50C-407E-A947-70E740481C1C}">
-                <a14:useLocalDpi xmlns:a14="http://schemas.microsoft.com/office/drawing/2010/main" val="0"/>
-              </a:ext>
-            </a:extLst>
-          </a:blip>
-          <a:stretch>
-            <a:fillRect/>
-          </a:stretch>
-        </p:blipFill>
-        <p:spPr>
-          <a:xfrm>
-            <a:off x="42035360" y="19187529"/>
-            <a:ext cx="7488945" cy="3622249"/>
           </a:xfrm>
           <a:prstGeom prst="rect">
             <a:avLst/>
@@ -29507,7 +29387,7 @@
         </p:nvSpPr>
         <p:spPr>
           <a:xfrm>
-            <a:off x="38767651" y="19816465"/>
+            <a:off x="38110615" y="19798779"/>
             <a:ext cx="3420446" cy="845749"/>
           </a:xfrm>
           <a:prstGeom prst="rect">
@@ -29601,7 +29481,7 @@
           <a:lstStyle/>
           <a:p>
             <a:pPr algn="ctr"/>
-            <a:endParaRPr lang="es-AR"/>
+            <a:endParaRPr lang="es-AR" dirty="0"/>
           </a:p>
         </p:txBody>
       </p:sp>
@@ -29613,7 +29493,7 @@
         </p:nvSpPr>
         <p:spPr>
           <a:xfrm>
-            <a:off x="20073324" y="13444764"/>
+            <a:off x="20036607" y="13606091"/>
             <a:ext cx="2255857" cy="814705"/>
           </a:xfrm>
           <a:prstGeom prst="rect">
@@ -29647,7 +29527,7 @@
           </a:lstStyle>
           <a:p>
             <a:r>
-              <a:rPr lang="es-AR" dirty="0" err="1" smtClean="0"/>
+              <a:rPr lang="es-AR" dirty="0" smtClean="0"/>
               <a:t>ScrumUP</a:t>
             </a:r>
             <a:endParaRPr lang="es-AR" dirty="0"/>
@@ -29694,18 +29574,18 @@
       <p:cxnSp>
         <p:nvCxnSpPr>
           <p:cNvPr id="94" name="93 Conector curvado"/>
-          <p:cNvCxnSpPr/>
+          <p:cNvCxnSpPr>
+            <a:stCxn id="91" idx="3"/>
+          </p:cNvCxnSpPr>
           <p:nvPr/>
         </p:nvCxnSpPr>
         <p:spPr>
           <a:xfrm rot="5400000">
-            <a:off x="16788050" y="15232227"/>
-            <a:ext cx="4490956" cy="2789462"/>
+            <a:off x="17667171" y="14014613"/>
+            <a:ext cx="2536979" cy="3270713"/>
           </a:xfrm>
-          <a:prstGeom prst="curvedConnector3">
-            <a:avLst>
-              <a:gd name="adj1" fmla="val 50000"/>
-            </a:avLst>
+          <a:prstGeom prst="curvedConnector2">
+            <a:avLst/>
           </a:prstGeom>
           <a:ln w="101600">
             <a:tailEnd type="arrow"/>
@@ -29730,14 +29610,14 @@
         <p:nvCxnSpPr>
           <p:cNvPr id="95" name="94 Conector curvado"/>
           <p:cNvCxnSpPr>
-            <a:stCxn id="92" idx="0"/>
+            <a:stCxn id="91" idx="0"/>
           </p:cNvCxnSpPr>
           <p:nvPr/>
         </p:nvCxnSpPr>
         <p:spPr>
           <a:xfrm rot="16200000" flipV="1">
-            <a:off x="15757724" y="8001234"/>
-            <a:ext cx="3616389" cy="7270671"/>
+            <a:off x="15820034" y="8063536"/>
+            <a:ext cx="3455058" cy="7307391"/>
           </a:xfrm>
           <a:prstGeom prst="curvedConnector2">
             <a:avLst/>
@@ -29795,7 +29675,7 @@
           <a:lstStyle/>
           <a:p>
             <a:pPr algn="ctr"/>
-            <a:endParaRPr lang="es-AR"/>
+            <a:endParaRPr lang="es-AR" dirty="0"/>
           </a:p>
         </p:txBody>
       </p:sp>
@@ -29891,7 +29771,7 @@
         <p:spPr>
           <a:xfrm>
             <a:off x="2553316" y="7726329"/>
-            <a:ext cx="6628738" cy="523220"/>
+            <a:ext cx="7487947" cy="523220"/>
           </a:xfrm>
           <a:prstGeom prst="rect">
             <a:avLst/>
@@ -29909,8 +29789,19 @@
                 <a:latin typeface="Courier New" pitchFamily="49" charset="0"/>
                 <a:cs typeface="Courier New" pitchFamily="49" charset="0"/>
               </a:rPr>
-              <a:t>Metodología: Soporte al Diseño</a:t>
+              <a:t>Metodología: Soporte al </a:t>
             </a:r>
+            <a:r>
+              <a:rPr lang="es-AR" sz="2800" b="1" dirty="0" smtClean="0">
+                <a:latin typeface="Courier New" pitchFamily="49" charset="0"/>
+                <a:cs typeface="Courier New" pitchFamily="49" charset="0"/>
+              </a:rPr>
+              <a:t>Desarrollo</a:t>
+            </a:r>
+            <a:endParaRPr lang="es-AR" sz="2800" b="1" dirty="0">
+              <a:latin typeface="Courier New" pitchFamily="49" charset="0"/>
+              <a:cs typeface="Courier New" pitchFamily="49" charset="0"/>
+            </a:endParaRPr>
           </a:p>
         </p:txBody>
       </p:sp>
@@ -29923,7 +29814,7 @@
           <p:nvPr/>
         </p:nvPicPr>
         <p:blipFill>
-          <a:blip r:embed="rId15">
+          <a:blip r:embed="rId14" cstate="print">
             <a:extLst>
               <a:ext uri="{28A0092B-C50C-407E-A947-70E740481C1C}">
                 <a14:useLocalDpi xmlns:a14="http://schemas.microsoft.com/office/drawing/2010/main" val="0"/>
@@ -29996,7 +29887,7 @@
         </p:xfrm>
         <a:graphic>
           <a:graphicData uri="http://schemas.openxmlformats.org/drawingml/2006/diagram">
-            <dgm:relIds xmlns:dgm="http://schemas.openxmlformats.org/drawingml/2006/diagram" xmlns:r="http://schemas.openxmlformats.org/officeDocument/2006/relationships" r:dm="rId16" r:lo="rId17" r:qs="rId18" r:cs="rId19"/>
+            <dgm:relIds xmlns:dgm="http://schemas.openxmlformats.org/drawingml/2006/diagram" xmlns:r="http://schemas.openxmlformats.org/officeDocument/2006/relationships" r:dm="rId15" r:lo="rId16" r:qs="rId17" r:cs="rId18"/>
           </a:graphicData>
         </a:graphic>
       </p:graphicFrame>
@@ -30007,7 +29898,7 @@
           <p:nvPr>
             <p:extLst>
               <p:ext uri="{D42A27DB-BD31-4B8C-83A1-F6EECF244321}">
-                <p14:modId xmlns:p14="http://schemas.microsoft.com/office/powerpoint/2010/main" val="2782103586"/>
+                <p14:modId xmlns:p14="http://schemas.microsoft.com/office/powerpoint/2010/main" val="2450646745"/>
               </p:ext>
             </p:extLst>
           </p:nvPr>
@@ -30018,7 +29909,7 @@
         </p:xfrm>
         <a:graphic>
           <a:graphicData uri="http://schemas.openxmlformats.org/drawingml/2006/diagram">
-            <dgm:relIds xmlns:dgm="http://schemas.openxmlformats.org/drawingml/2006/diagram" xmlns:r="http://schemas.openxmlformats.org/officeDocument/2006/relationships" r:dm="rId21" r:lo="rId22" r:qs="rId23" r:cs="rId24"/>
+            <dgm:relIds xmlns:dgm="http://schemas.openxmlformats.org/drawingml/2006/diagram" xmlns:r="http://schemas.openxmlformats.org/officeDocument/2006/relationships" r:dm="rId20" r:lo="rId21" r:qs="rId22" r:cs="rId23"/>
           </a:graphicData>
         </a:graphic>
       </p:graphicFrame>
@@ -30143,7 +30034,7 @@
           <p:nvPr/>
         </p:nvPicPr>
         <p:blipFill>
-          <a:blip r:embed="rId26">
+          <a:blip r:embed="rId25" cstate="print">
             <a:extLst>
               <a:ext uri="{28A0092B-C50C-407E-A947-70E740481C1C}">
                 <a14:useLocalDpi xmlns:a14="http://schemas.microsoft.com/office/drawing/2010/main" val="0"/>
@@ -30207,7 +30098,7 @@
           <p:nvPr/>
         </p:nvPicPr>
         <p:blipFill>
-          <a:blip r:embed="rId27">
+          <a:blip r:embed="rId26" cstate="print">
             <a:extLst>
               <a:ext uri="{28A0092B-C50C-407E-A947-70E740481C1C}">
                 <a14:useLocalDpi xmlns:a14="http://schemas.microsoft.com/office/drawing/2010/main" val="0"/>
@@ -30221,7 +30112,7 @@
         </p:blipFill>
         <p:spPr bwMode="auto">
           <a:xfrm>
-            <a:off x="15666287" y="1275727"/>
+            <a:off x="15500103" y="1275727"/>
             <a:ext cx="4572000" cy="3429000"/>
           </a:xfrm>
           <a:prstGeom prst="rect">
@@ -30331,7 +30222,7 @@
         </p:nvSpPr>
         <p:spPr>
           <a:xfrm>
-            <a:off x="20428259" y="2444851"/>
+            <a:off x="20180623" y="2444851"/>
             <a:ext cx="1048510" cy="936104"/>
           </a:xfrm>
           <a:prstGeom prst="rightArrow">
@@ -30393,7 +30284,7 @@
           <p:nvPr/>
         </p:nvPicPr>
         <p:blipFill>
-          <a:blip r:embed="rId28">
+          <a:blip r:embed="rId27" cstate="print">
             <a:extLst>
               <a:ext uri="{28A0092B-C50C-407E-A947-70E740481C1C}">
                 <a14:useLocalDpi xmlns:a14="http://schemas.microsoft.com/office/drawing/2010/main" val="0"/>
@@ -30493,7 +30384,7 @@
           <p:nvPr/>
         </p:nvPicPr>
         <p:blipFill>
-          <a:blip r:embed="rId29">
+          <a:blip r:embed="rId28" cstate="print">
             <a:extLst>
               <a:ext uri="{28A0092B-C50C-407E-A947-70E740481C1C}">
                 <a14:useLocalDpi xmlns:a14="http://schemas.microsoft.com/office/drawing/2010/main" val="0"/>
@@ -30509,70 +30400,6 @@
           <a:xfrm>
             <a:off x="31050464" y="5296742"/>
             <a:ext cx="5438778" cy="2347111"/>
-          </a:xfrm>
-          <a:prstGeom prst="rect">
-            <a:avLst/>
-          </a:prstGeom>
-          <a:noFill/>
-          <a:ln>
-            <a:noFill/>
-          </a:ln>
-          <a:effectLst/>
-          <a:extLst>
-            <a:ext uri="{909E8E84-426E-40DD-AFC4-6F175D3DCCD1}">
-              <a14:hiddenFill xmlns:a14="http://schemas.microsoft.com/office/drawing/2010/main">
-                <a:solidFill>
-                  <a:schemeClr val="accent1"/>
-                </a:solidFill>
-              </a14:hiddenFill>
-            </a:ext>
-            <a:ext uri="{91240B29-F687-4F45-9708-019B960494DF}">
-              <a14:hiddenLine xmlns:a14="http://schemas.microsoft.com/office/drawing/2010/main" w="9525">
-                <a:solidFill>
-                  <a:schemeClr val="tx1"/>
-                </a:solidFill>
-                <a:miter lim="800000"/>
-                <a:headEnd/>
-                <a:tailEnd/>
-              </a14:hiddenLine>
-            </a:ext>
-            <a:ext uri="{AF507438-7753-43E0-B8FC-AC1667EBCBE1}">
-              <a14:hiddenEffects xmlns:a14="http://schemas.microsoft.com/office/drawing/2010/main">
-                <a:effectLst>
-                  <a:outerShdw dist="35921" dir="2700000" algn="ctr" rotWithShape="0">
-                    <a:schemeClr val="bg2"/>
-                  </a:outerShdw>
-                </a:effectLst>
-              </a14:hiddenEffects>
-            </a:ext>
-          </a:extLst>
-        </p:spPr>
-      </p:pic>
-      <p:pic>
-        <p:nvPicPr>
-          <p:cNvPr id="19" name="Picture 2"/>
-          <p:cNvPicPr>
-            <a:picLocks noChangeAspect="1" noChangeArrowheads="1"/>
-          </p:cNvPicPr>
-          <p:nvPr/>
-        </p:nvPicPr>
-        <p:blipFill>
-          <a:blip r:embed="rId30">
-            <a:extLst>
-              <a:ext uri="{28A0092B-C50C-407E-A947-70E740481C1C}">
-                <a14:useLocalDpi xmlns:a14="http://schemas.microsoft.com/office/drawing/2010/main" val="0"/>
-              </a:ext>
-            </a:extLst>
-          </a:blip>
-          <a:srcRect/>
-          <a:stretch>
-            <a:fillRect/>
-          </a:stretch>
-        </p:blipFill>
-        <p:spPr bwMode="auto">
-          <a:xfrm>
-            <a:off x="244186" y="13958191"/>
-            <a:ext cx="7160699" cy="3872986"/>
           </a:xfrm>
           <a:prstGeom prst="rect">
             <a:avLst/>
@@ -30663,7 +30490,7 @@
         </p:nvSpPr>
         <p:spPr>
           <a:xfrm>
-            <a:off x="1900370" y="18023709"/>
+            <a:off x="1458543" y="20590867"/>
             <a:ext cx="4922310" cy="400110"/>
           </a:xfrm>
           <a:prstGeom prst="rect">
@@ -30697,70 +30524,6 @@
           </a:p>
         </p:txBody>
       </p:sp>
-      <p:pic>
-        <p:nvPicPr>
-          <p:cNvPr id="1028" name="Picture 4"/>
-          <p:cNvPicPr>
-            <a:picLocks noChangeAspect="1" noChangeArrowheads="1"/>
-          </p:cNvPicPr>
-          <p:nvPr/>
-        </p:nvPicPr>
-        <p:blipFill>
-          <a:blip r:embed="rId31">
-            <a:extLst>
-              <a:ext uri="{28A0092B-C50C-407E-A947-70E740481C1C}">
-                <a14:useLocalDpi xmlns:a14="http://schemas.microsoft.com/office/drawing/2010/main" val="0"/>
-              </a:ext>
-            </a:extLst>
-          </a:blip>
-          <a:srcRect/>
-          <a:stretch>
-            <a:fillRect/>
-          </a:stretch>
-        </p:blipFill>
-        <p:spPr bwMode="auto">
-          <a:xfrm>
-            <a:off x="8685752" y="13908242"/>
-            <a:ext cx="6072186" cy="1690687"/>
-          </a:xfrm>
-          <a:prstGeom prst="rect">
-            <a:avLst/>
-          </a:prstGeom>
-          <a:noFill/>
-          <a:ln>
-            <a:noFill/>
-          </a:ln>
-          <a:effectLst/>
-          <a:extLst>
-            <a:ext uri="{909E8E84-426E-40DD-AFC4-6F175D3DCCD1}">
-              <a14:hiddenFill xmlns:a14="http://schemas.microsoft.com/office/drawing/2010/main">
-                <a:solidFill>
-                  <a:schemeClr val="accent1"/>
-                </a:solidFill>
-              </a14:hiddenFill>
-            </a:ext>
-            <a:ext uri="{91240B29-F687-4F45-9708-019B960494DF}">
-              <a14:hiddenLine xmlns:a14="http://schemas.microsoft.com/office/drawing/2010/main" w="9525">
-                <a:solidFill>
-                  <a:schemeClr val="tx1"/>
-                </a:solidFill>
-                <a:miter lim="800000"/>
-                <a:headEnd/>
-                <a:tailEnd/>
-              </a14:hiddenLine>
-            </a:ext>
-            <a:ext uri="{AF507438-7753-43E0-B8FC-AC1667EBCBE1}">
-              <a14:hiddenEffects xmlns:a14="http://schemas.microsoft.com/office/drawing/2010/main">
-                <a:effectLst>
-                  <a:outerShdw dist="35921" dir="2700000" algn="ctr" rotWithShape="0">
-                    <a:schemeClr val="bg2"/>
-                  </a:outerShdw>
-                </a:effectLst>
-              </a14:hiddenEffects>
-            </a:ext>
-          </a:extLst>
-        </p:spPr>
-      </p:pic>
       <p:sp>
         <p:nvSpPr>
           <p:cNvPr id="133" name="132 Flecha derecha"/>
@@ -30830,7 +30593,7 @@
         </p:nvSpPr>
         <p:spPr>
           <a:xfrm>
-            <a:off x="9371433" y="15598929"/>
+            <a:off x="11894953" y="16486411"/>
             <a:ext cx="3893182" cy="400110"/>
           </a:xfrm>
           <a:prstGeom prst="rect">
@@ -30865,7 +30628,7 @@
           <p:nvPr/>
         </p:nvPicPr>
         <p:blipFill>
-          <a:blip r:embed="rId32">
+          <a:blip r:embed="rId29" cstate="print">
             <a:extLst>
               <a:ext uri="{28A0092B-C50C-407E-A947-70E740481C1C}">
                 <a14:useLocalDpi xmlns:a14="http://schemas.microsoft.com/office/drawing/2010/main" val="0"/>
@@ -30879,7 +30642,7 @@
         </p:blipFill>
         <p:spPr bwMode="auto">
           <a:xfrm>
-            <a:off x="8021050" y="17012426"/>
+            <a:off x="7687228" y="17143052"/>
             <a:ext cx="8677472" cy="4923207"/>
           </a:xfrm>
           <a:prstGeom prst="rect">
@@ -30928,7 +30691,7 @@
         </p:nvSpPr>
         <p:spPr>
           <a:xfrm rot="5400000">
-            <a:off x="11197590" y="16037879"/>
+            <a:off x="11123420" y="16398598"/>
             <a:ext cx="1048510" cy="936104"/>
           </a:xfrm>
           <a:prstGeom prst="rightArrow">
@@ -31018,13 +30781,15 @@
       <p:cxnSp>
         <p:nvCxnSpPr>
           <p:cNvPr id="149" name="148 Conector curvado"/>
-          <p:cNvCxnSpPr/>
+          <p:cNvCxnSpPr>
+            <a:stCxn id="91" idx="4"/>
+          </p:cNvCxnSpPr>
           <p:nvPr/>
         </p:nvCxnSpPr>
         <p:spPr>
           <a:xfrm rot="5400000">
-            <a:off x="15840952" y="17495966"/>
-            <a:ext cx="7869509" cy="2105981"/>
+            <a:off x="15991231" y="17273683"/>
+            <a:ext cx="7941515" cy="2478541"/>
           </a:xfrm>
           <a:prstGeom prst="curvedConnector3">
             <a:avLst>
@@ -31059,7 +30824,7 @@
           <p:nvPr/>
         </p:nvPicPr>
         <p:blipFill>
-          <a:blip r:embed="rId33">
+          <a:blip r:embed="rId30" cstate="print">
             <a:extLst>
               <a:ext uri="{28A0092B-C50C-407E-A947-70E740481C1C}">
                 <a14:useLocalDpi xmlns:a14="http://schemas.microsoft.com/office/drawing/2010/main" val="0"/>
@@ -31123,7 +30888,7 @@
           <p:nvPr/>
         </p:nvPicPr>
         <p:blipFill>
-          <a:blip r:embed="rId34">
+          <a:blip r:embed="rId31" cstate="print">
             <a:extLst>
               <a:ext uri="{28A0092B-C50C-407E-A947-70E740481C1C}">
                 <a14:useLocalDpi xmlns:a14="http://schemas.microsoft.com/office/drawing/2010/main" val="0"/>
@@ -31187,7 +30952,7 @@
           <p:nvPr/>
         </p:nvPicPr>
         <p:blipFill>
-          <a:blip r:embed="rId35">
+          <a:blip r:embed="rId32" cstate="print">
             <a:extLst>
               <a:ext uri="{28A0092B-C50C-407E-A947-70E740481C1C}">
                 <a14:useLocalDpi xmlns:a14="http://schemas.microsoft.com/office/drawing/2010/main" val="0"/>
@@ -31240,6 +31005,94 @@
               </a14:hiddenEffects>
             </a:ext>
           </a:extLst>
+        </p:spPr>
+      </p:pic>
+      <p:pic>
+        <p:nvPicPr>
+          <p:cNvPr id="11" name="Picture 4"/>
+          <p:cNvPicPr>
+            <a:picLocks noChangeAspect="1" noChangeArrowheads="1"/>
+          </p:cNvPicPr>
+          <p:nvPr/>
+        </p:nvPicPr>
+        <p:blipFill>
+          <a:blip r:embed="rId33" cstate="print"/>
+          <a:srcRect/>
+          <a:stretch>
+            <a:fillRect/>
+          </a:stretch>
+        </p:blipFill>
+        <p:spPr bwMode="auto">
+          <a:xfrm>
+            <a:off x="321491" y="14145503"/>
+            <a:ext cx="7056784" cy="6373356"/>
+          </a:xfrm>
+          <a:prstGeom prst="rect">
+            <a:avLst/>
+          </a:prstGeom>
+          <a:noFill/>
+          <a:ln w="9525">
+            <a:noFill/>
+            <a:miter lim="800000"/>
+            <a:headEnd/>
+            <a:tailEnd/>
+          </a:ln>
+        </p:spPr>
+      </p:pic>
+      <p:pic>
+        <p:nvPicPr>
+          <p:cNvPr id="1031" name="Picture 7"/>
+          <p:cNvPicPr>
+            <a:picLocks noChangeAspect="1" noChangeArrowheads="1"/>
+          </p:cNvPicPr>
+          <p:nvPr/>
+        </p:nvPicPr>
+        <p:blipFill>
+          <a:blip r:embed="rId34" cstate="print"/>
+          <a:srcRect/>
+          <a:stretch>
+            <a:fillRect/>
+          </a:stretch>
+        </p:blipFill>
+        <p:spPr bwMode="auto">
+          <a:xfrm>
+            <a:off x="9379423" y="13892704"/>
+            <a:ext cx="6480720" cy="2665715"/>
+          </a:xfrm>
+          <a:prstGeom prst="rect">
+            <a:avLst/>
+          </a:prstGeom>
+          <a:noFill/>
+          <a:ln w="9525">
+            <a:noFill/>
+            <a:miter lim="800000"/>
+            <a:headEnd/>
+            <a:tailEnd/>
+          </a:ln>
+        </p:spPr>
+      </p:pic>
+      <p:pic>
+        <p:nvPicPr>
+          <p:cNvPr id="120" name="Picture 119" descr="Estructura Procesos.jpg"/>
+          <p:cNvPicPr>
+            <a:picLocks noChangeAspect="1"/>
+          </p:cNvPicPr>
+          <p:nvPr/>
+        </p:nvPicPr>
+        <p:blipFill>
+          <a:blip r:embed="rId35" cstate="print"/>
+          <a:stretch>
+            <a:fillRect/>
+          </a:stretch>
+        </p:blipFill>
+        <p:spPr>
+          <a:xfrm>
+            <a:off x="42431095" y="13174043"/>
+            <a:ext cx="7570421" cy="6169893"/>
+          </a:xfrm>
+          <a:prstGeom prst="rect">
+            <a:avLst/>
+          </a:prstGeom>
         </p:spPr>
       </p:pic>
     </p:spTree>
@@ -31428,6 +31281,28 @@
           <a:chExt cx="0" cy="0"/>
         </a:xfrm>
       </p:grpSpPr>
+      <p:graphicFrame>
+        <p:nvGraphicFramePr>
+          <p:cNvPr id="7" name="6 Diagrama"/>
+          <p:cNvGraphicFramePr/>
+          <p:nvPr>
+            <p:extLst>
+              <p:ext uri="{D42A27DB-BD31-4B8C-83A1-F6EECF244321}">
+                <p14:modId xmlns:p14="http://schemas.microsoft.com/office/powerpoint/2010/main" val="320916673"/>
+              </p:ext>
+            </p:extLst>
+          </p:nvPr>
+        </p:nvGraphicFramePr>
+        <p:xfrm>
+          <a:off x="4482879" y="6333283"/>
+          <a:ext cx="44428936" cy="29523280"/>
+        </p:xfrm>
+        <a:graphic>
+          <a:graphicData uri="http://schemas.openxmlformats.org/drawingml/2006/diagram">
+            <dgm:relIds xmlns:dgm="http://schemas.openxmlformats.org/drawingml/2006/diagram" xmlns:r="http://schemas.openxmlformats.org/officeDocument/2006/relationships" r:dm="rId3" r:lo="rId4" r:qs="rId5" r:cs="rId6"/>
+          </a:graphicData>
+        </a:graphic>
+      </p:graphicFrame>
       <p:pic>
         <p:nvPicPr>
           <p:cNvPr id="2050" name="Picture 2"/>
@@ -31437,7 +31312,7 @@
           <p:nvPr/>
         </p:nvPicPr>
         <p:blipFill>
-          <a:blip r:embed="rId3" cstate="print"/>
+          <a:blip r:embed="rId8" cstate="print"/>
           <a:srcRect/>
           <a:stretch>
             <a:fillRect/>
@@ -31492,7 +31367,7 @@
           <p:nvPr/>
         </p:nvPicPr>
         <p:blipFill>
-          <a:blip r:embed="rId4" cstate="print">
+          <a:blip r:embed="rId9" cstate="print">
             <a:extLst>
               <a:ext uri="{28A0092B-C50C-407E-A947-70E740481C1C}">
                 <a14:useLocalDpi xmlns:a14="http://schemas.microsoft.com/office/drawing/2010/main" val="0"/>
@@ -31522,7 +31397,7 @@
           <p:nvPr/>
         </p:nvPicPr>
         <p:blipFill>
-          <a:blip r:embed="rId5" cstate="print"/>
+          <a:blip r:embed="rId10" cstate="print"/>
           <a:srcRect/>
           <a:stretch>
             <a:fillRect/>
@@ -31545,28 +31420,6 @@
           </a:ln>
         </p:spPr>
       </p:pic>
-      <p:graphicFrame>
-        <p:nvGraphicFramePr>
-          <p:cNvPr id="7" name="6 Diagrama"/>
-          <p:cNvGraphicFramePr/>
-          <p:nvPr>
-            <p:extLst>
-              <p:ext uri="{D42A27DB-BD31-4B8C-83A1-F6EECF244321}">
-                <p14:modId xmlns:p14="http://schemas.microsoft.com/office/powerpoint/2010/main" val="3189052918"/>
-              </p:ext>
-            </p:extLst>
-          </p:nvPr>
-        </p:nvGraphicFramePr>
-        <p:xfrm>
-          <a:off x="4482879" y="6333283"/>
-          <a:ext cx="44428936" cy="29523280"/>
-        </p:xfrm>
-        <a:graphic>
-          <a:graphicData uri="http://schemas.openxmlformats.org/drawingml/2006/diagram">
-            <dgm:relIds xmlns:dgm="http://schemas.openxmlformats.org/drawingml/2006/diagram" xmlns:r="http://schemas.openxmlformats.org/officeDocument/2006/relationships" r:dm="rId6" r:lo="rId7" r:qs="rId8" r:cs="rId9"/>
-          </a:graphicData>
-        </a:graphic>
-      </p:graphicFrame>
     </p:spTree>
     <p:extLst>
       <p:ext uri="{BB962C8B-B14F-4D97-AF65-F5344CB8AC3E}">

</xml_diff>